<commit_message>
Tweak to architecture diagram
</commit_message>
<xml_diff>
--- a/docs/deployment_guide/images/linux-bastion-architecture.pptx
+++ b/docs/deployment_guide/images/linux-bastion-architecture.pptx
@@ -259,7 +259,7 @@
           <a:p>
             <a:fld id="{CE265776-E725-4370-93A2-9BC168D9AE14}" type="datetimeFigureOut">
               <a:rPr lang="en-US" smtClean="0"/>
-              <a:t>8/9/2022</a:t>
+              <a:t>9/20/2022</a:t>
             </a:fld>
             <a:endParaRPr lang="en-US"/>
           </a:p>
@@ -457,7 +457,7 @@
           <a:p>
             <a:fld id="{CE265776-E725-4370-93A2-9BC168D9AE14}" type="datetimeFigureOut">
               <a:rPr lang="en-US" smtClean="0"/>
-              <a:t>8/9/2022</a:t>
+              <a:t>9/20/2022</a:t>
             </a:fld>
             <a:endParaRPr lang="en-US"/>
           </a:p>
@@ -665,7 +665,7 @@
           <a:p>
             <a:fld id="{CE265776-E725-4370-93A2-9BC168D9AE14}" type="datetimeFigureOut">
               <a:rPr lang="en-US" smtClean="0"/>
-              <a:t>8/9/2022</a:t>
+              <a:t>9/20/2022</a:t>
             </a:fld>
             <a:endParaRPr lang="en-US"/>
           </a:p>
@@ -863,7 +863,7 @@
           <a:p>
             <a:fld id="{CE265776-E725-4370-93A2-9BC168D9AE14}" type="datetimeFigureOut">
               <a:rPr lang="en-US" smtClean="0"/>
-              <a:t>8/9/2022</a:t>
+              <a:t>9/20/2022</a:t>
             </a:fld>
             <a:endParaRPr lang="en-US"/>
           </a:p>
@@ -1138,7 +1138,7 @@
           <a:p>
             <a:fld id="{CE265776-E725-4370-93A2-9BC168D9AE14}" type="datetimeFigureOut">
               <a:rPr lang="en-US" smtClean="0"/>
-              <a:t>8/9/2022</a:t>
+              <a:t>9/20/2022</a:t>
             </a:fld>
             <a:endParaRPr lang="en-US"/>
           </a:p>
@@ -1403,7 +1403,7 @@
           <a:p>
             <a:fld id="{CE265776-E725-4370-93A2-9BC168D9AE14}" type="datetimeFigureOut">
               <a:rPr lang="en-US" smtClean="0"/>
-              <a:t>8/9/2022</a:t>
+              <a:t>9/20/2022</a:t>
             </a:fld>
             <a:endParaRPr lang="en-US"/>
           </a:p>
@@ -1815,7 +1815,7 @@
           <a:p>
             <a:fld id="{CE265776-E725-4370-93A2-9BC168D9AE14}" type="datetimeFigureOut">
               <a:rPr lang="en-US" smtClean="0"/>
-              <a:t>8/9/2022</a:t>
+              <a:t>9/20/2022</a:t>
             </a:fld>
             <a:endParaRPr lang="en-US"/>
           </a:p>
@@ -1956,7 +1956,7 @@
           <a:p>
             <a:fld id="{CE265776-E725-4370-93A2-9BC168D9AE14}" type="datetimeFigureOut">
               <a:rPr lang="en-US" smtClean="0"/>
-              <a:t>8/9/2022</a:t>
+              <a:t>9/20/2022</a:t>
             </a:fld>
             <a:endParaRPr lang="en-US"/>
           </a:p>
@@ -2069,7 +2069,7 @@
           <a:p>
             <a:fld id="{CE265776-E725-4370-93A2-9BC168D9AE14}" type="datetimeFigureOut">
               <a:rPr lang="en-US" smtClean="0"/>
-              <a:t>8/9/2022</a:t>
+              <a:t>9/20/2022</a:t>
             </a:fld>
             <a:endParaRPr lang="en-US"/>
           </a:p>
@@ -2380,7 +2380,7 @@
           <a:p>
             <a:fld id="{CE265776-E725-4370-93A2-9BC168D9AE14}" type="datetimeFigureOut">
               <a:rPr lang="en-US" smtClean="0"/>
-              <a:t>8/9/2022</a:t>
+              <a:t>9/20/2022</a:t>
             </a:fld>
             <a:endParaRPr lang="en-US"/>
           </a:p>
@@ -2668,7 +2668,7 @@
           <a:p>
             <a:fld id="{CE265776-E725-4370-93A2-9BC168D9AE14}" type="datetimeFigureOut">
               <a:rPr lang="en-US" smtClean="0"/>
-              <a:t>8/9/2022</a:t>
+              <a:t>9/20/2022</a:t>
             </a:fld>
             <a:endParaRPr lang="en-US"/>
           </a:p>
@@ -2909,7 +2909,7 @@
           <a:p>
             <a:fld id="{CE265776-E725-4370-93A2-9BC168D9AE14}" type="datetimeFigureOut">
               <a:rPr lang="en-US" smtClean="0"/>
-              <a:t>8/9/2022</a:t>
+              <a:t>9/20/2022</a:t>
             </a:fld>
             <a:endParaRPr lang="en-US"/>
           </a:p>
@@ -3326,2287 +3326,2266 @@
           <a:chExt cx="0" cy="0"/>
         </a:xfrm>
       </p:grpSpPr>
-      <p:grpSp>
-        <p:nvGrpSpPr>
-          <p:cNvPr id="11" name="Group 10">
-            <a:extLst>
-              <a:ext uri="{FF2B5EF4-FFF2-40B4-BE49-F238E27FC236}">
-                <a16:creationId xmlns:a16="http://schemas.microsoft.com/office/drawing/2014/main" id="{DCFBC9B6-676F-4053-A38D-A2F62774F371}"/>
-              </a:ext>
-            </a:extLst>
-          </p:cNvPr>
-          <p:cNvGrpSpPr/>
+      <p:sp>
+        <p:nvSpPr>
+          <p:cNvPr id="34" name="Rectangle 33">
+            <a:extLst>
+              <a:ext uri="{FF2B5EF4-FFF2-40B4-BE49-F238E27FC236}">
+                <a16:creationId xmlns:a16="http://schemas.microsoft.com/office/drawing/2014/main" id="{D0AFACA5-3328-40E1-8218-BA1741C59D2D}"/>
+              </a:ext>
+            </a:extLst>
+          </p:cNvPr>
+          <p:cNvSpPr/>
           <p:nvPr/>
-        </p:nvGrpSpPr>
-        <p:grpSpPr>
+        </p:nvSpPr>
+        <p:spPr>
+          <a:xfrm>
+            <a:off x="4933065" y="1850314"/>
+            <a:ext cx="1807399" cy="2504774"/>
+          </a:xfrm>
+          <a:prstGeom prst="rect">
+            <a:avLst/>
+          </a:prstGeom>
+          <a:solidFill>
+            <a:srgbClr val="1D8900">
+              <a:alpha val="9804"/>
+            </a:srgbClr>
+          </a:solidFill>
+          <a:ln w="12700">
+            <a:noFill/>
+            <a:prstDash val="dash"/>
+          </a:ln>
+        </p:spPr>
+        <p:style>
+          <a:lnRef idx="2">
+            <a:schemeClr val="accent1">
+              <a:shade val="50000"/>
+            </a:schemeClr>
+          </a:lnRef>
+          <a:fillRef idx="1">
+            <a:schemeClr val="accent1"/>
+          </a:fillRef>
+          <a:effectRef idx="0">
+            <a:schemeClr val="accent1"/>
+          </a:effectRef>
+          <a:fontRef idx="minor">
+            <a:schemeClr val="lt1"/>
+          </a:fontRef>
+        </p:style>
+        <p:txBody>
+          <a:bodyPr lIns="502920"/>
+          <a:lstStyle/>
+          <a:p>
+            <a:pPr eaLnBrk="1" fontAlgn="auto" hangingPunct="1">
+              <a:spcBef>
+                <a:spcPts val="0"/>
+              </a:spcBef>
+              <a:spcAft>
+                <a:spcPts val="0"/>
+              </a:spcAft>
+              <a:defRPr/>
+            </a:pPr>
+            <a:r>
+              <a:rPr lang="en-US" sz="1200" dirty="0">
+                <a:solidFill>
+                  <a:srgbClr val="1E8900"/>
+                </a:solidFill>
+                <a:latin typeface="Arial" panose="020B0604020202020204" pitchFamily="34" charset="0"/>
+                <a:cs typeface="Arial" panose="020B0604020202020204" pitchFamily="34" charset="0"/>
+              </a:rPr>
+              <a:t>Public subnet</a:t>
+            </a:r>
+          </a:p>
+        </p:txBody>
+      </p:sp>
+      <p:sp>
+        <p:nvSpPr>
+          <p:cNvPr id="4" name="Rectangle 3">
+            <a:extLst>
+              <a:ext uri="{FF2B5EF4-FFF2-40B4-BE49-F238E27FC236}">
+                <a16:creationId xmlns:a16="http://schemas.microsoft.com/office/drawing/2014/main" id="{973EEB97-7870-4852-ABF9-4DD95FABDD36}"/>
+              </a:ext>
+            </a:extLst>
+          </p:cNvPr>
+          <p:cNvSpPr/>
+          <p:nvPr/>
+        </p:nvSpPr>
+        <p:spPr>
+          <a:xfrm>
+            <a:off x="614856" y="707314"/>
+            <a:ext cx="7831312" cy="5204201"/>
+          </a:xfrm>
+          <a:prstGeom prst="rect">
+            <a:avLst/>
+          </a:prstGeom>
+          <a:noFill/>
+          <a:ln w="12700">
+            <a:solidFill>
+              <a:schemeClr val="tx1"/>
+            </a:solidFill>
+          </a:ln>
+        </p:spPr>
+        <p:style>
+          <a:lnRef idx="2">
+            <a:schemeClr val="accent1">
+              <a:shade val="50000"/>
+            </a:schemeClr>
+          </a:lnRef>
+          <a:fillRef idx="1">
+            <a:schemeClr val="accent1"/>
+          </a:fillRef>
+          <a:effectRef idx="0">
+            <a:schemeClr val="accent1"/>
+          </a:effectRef>
+          <a:fontRef idx="minor">
+            <a:schemeClr val="lt1"/>
+          </a:fontRef>
+        </p:style>
+        <p:txBody>
+          <a:bodyPr lIns="502920" tIns="91440"/>
+          <a:lstStyle/>
+          <a:p>
+            <a:pPr eaLnBrk="1" fontAlgn="auto" hangingPunct="1">
+              <a:spcBef>
+                <a:spcPts val="0"/>
+              </a:spcBef>
+              <a:spcAft>
+                <a:spcPts val="0"/>
+              </a:spcAft>
+              <a:defRPr/>
+            </a:pPr>
+            <a:r>
+              <a:rPr lang="en-US" sz="1200" dirty="0">
+                <a:solidFill>
+                  <a:sysClr val="windowText" lastClr="000000"/>
+                </a:solidFill>
+                <a:latin typeface="Arial" panose="020B0604020202020204" pitchFamily="34" charset="0"/>
+                <a:cs typeface="Arial" panose="020B0604020202020204" pitchFamily="34" charset="0"/>
+              </a:rPr>
+              <a:t>AWS Cloud</a:t>
+            </a:r>
+          </a:p>
+        </p:txBody>
+      </p:sp>
+      <p:pic>
+        <p:nvPicPr>
+          <p:cNvPr id="5" name="Graphic 4">
+            <a:extLst>
+              <a:ext uri="{FF2B5EF4-FFF2-40B4-BE49-F238E27FC236}">
+                <a16:creationId xmlns:a16="http://schemas.microsoft.com/office/drawing/2014/main" id="{327654EB-06D6-4B35-901C-E2CAB9C88356}"/>
+              </a:ext>
+            </a:extLst>
+          </p:cNvPr>
+          <p:cNvPicPr>
+            <a:picLocks noChangeAspect="1"/>
+          </p:cNvPicPr>
+          <p:nvPr/>
+        </p:nvPicPr>
+        <p:blipFill>
+          <a:blip r:embed="rId2">
+            <a:extLst>
+              <a:ext uri="{96DAC541-7B7A-43D3-8B79-37D633B846F1}">
+                <asvg:svgBlip xmlns:asvg="http://schemas.microsoft.com/office/drawing/2016/SVG/main" r:embed="rId3"/>
+              </a:ext>
+            </a:extLst>
+          </a:blip>
+          <a:srcRect/>
+          <a:stretch/>
+        </p:blipFill>
+        <p:spPr>
           <a:xfrm>
             <a:off x="614855" y="707315"/>
-            <a:ext cx="9653271" cy="4455892"/>
-            <a:chOff x="614855" y="707315"/>
-            <a:chExt cx="9653271" cy="4455892"/>
+            <a:ext cx="381000" cy="381000"/>
           </a:xfrm>
-        </p:grpSpPr>
-        <p:sp>
-          <p:nvSpPr>
-            <p:cNvPr id="4" name="Rectangle 3">
-              <a:extLst>
-                <a:ext uri="{FF2B5EF4-FFF2-40B4-BE49-F238E27FC236}">
-                  <a16:creationId xmlns:a16="http://schemas.microsoft.com/office/drawing/2014/main" id="{973EEB97-7870-4852-ABF9-4DD95FABDD36}"/>
-                </a:ext>
-              </a:extLst>
-            </p:cNvPr>
-            <p:cNvSpPr/>
-            <p:nvPr/>
-          </p:nvSpPr>
-          <p:spPr>
-            <a:xfrm>
-              <a:off x="614856" y="707315"/>
-              <a:ext cx="9653270" cy="4455892"/>
-            </a:xfrm>
-            <a:prstGeom prst="rect">
-              <a:avLst/>
-            </a:prstGeom>
+          <a:prstGeom prst="rect">
+            <a:avLst/>
+          </a:prstGeom>
+        </p:spPr>
+      </p:pic>
+      <p:sp>
+        <p:nvSpPr>
+          <p:cNvPr id="6" name="Rectangle 5">
+            <a:extLst>
+              <a:ext uri="{FF2B5EF4-FFF2-40B4-BE49-F238E27FC236}">
+                <a16:creationId xmlns:a16="http://schemas.microsoft.com/office/drawing/2014/main" id="{5E46EA62-888D-48CF-B302-1596DD0CD665}"/>
+              </a:ext>
+            </a:extLst>
+          </p:cNvPr>
+          <p:cNvSpPr/>
+          <p:nvPr/>
+        </p:nvSpPr>
+        <p:spPr>
+          <a:xfrm>
+            <a:off x="836358" y="1469314"/>
+            <a:ext cx="6198105" cy="4121360"/>
+          </a:xfrm>
+          <a:prstGeom prst="rect">
+            <a:avLst/>
+          </a:prstGeom>
+          <a:noFill/>
+          <a:ln w="12700">
+            <a:solidFill>
+              <a:srgbClr val="1E8900"/>
+            </a:solidFill>
+          </a:ln>
+        </p:spPr>
+        <p:style>
+          <a:lnRef idx="2">
+            <a:schemeClr val="accent1">
+              <a:shade val="50000"/>
+            </a:schemeClr>
+          </a:lnRef>
+          <a:fillRef idx="1">
+            <a:schemeClr val="accent1"/>
+          </a:fillRef>
+          <a:effectRef idx="0">
+            <a:schemeClr val="accent1"/>
+          </a:effectRef>
+          <a:fontRef idx="minor">
+            <a:schemeClr val="lt1"/>
+          </a:fontRef>
+        </p:style>
+        <p:txBody>
+          <a:bodyPr lIns="502920" tIns="91440"/>
+          <a:lstStyle/>
+          <a:p>
+            <a:pPr eaLnBrk="1" fontAlgn="auto" hangingPunct="1">
+              <a:spcBef>
+                <a:spcPts val="0"/>
+              </a:spcBef>
+              <a:spcAft>
+                <a:spcPts val="0"/>
+              </a:spcAft>
+              <a:defRPr/>
+            </a:pPr>
+            <a:r>
+              <a:rPr lang="en-US" sz="1200" dirty="0">
+                <a:ln w="0"/>
+                <a:solidFill>
+                  <a:srgbClr val="1E8900"/>
+                </a:solidFill>
+                <a:latin typeface="Arial" panose="020B0604020202020204" pitchFamily="34" charset="0"/>
+                <a:cs typeface="Arial" panose="020B0604020202020204" pitchFamily="34" charset="0"/>
+              </a:rPr>
+              <a:t>VPC</a:t>
+            </a:r>
+          </a:p>
+        </p:txBody>
+      </p:sp>
+      <p:pic>
+        <p:nvPicPr>
+          <p:cNvPr id="7" name="Graphic 6">
+            <a:extLst>
+              <a:ext uri="{FF2B5EF4-FFF2-40B4-BE49-F238E27FC236}">
+                <a16:creationId xmlns:a16="http://schemas.microsoft.com/office/drawing/2014/main" id="{12F870B0-EEA9-49B3-A6FB-6D6E08989340}"/>
+              </a:ext>
+            </a:extLst>
+          </p:cNvPr>
+          <p:cNvPicPr>
+            <a:picLocks noChangeAspect="1"/>
+          </p:cNvPicPr>
+          <p:nvPr/>
+        </p:nvPicPr>
+        <p:blipFill>
+          <a:blip r:embed="rId4">
+            <a:extLst>
+              <a:ext uri="{96DAC541-7B7A-43D3-8B79-37D633B846F1}">
+                <asvg:svgBlip xmlns:asvg="http://schemas.microsoft.com/office/drawing/2016/SVG/main" r:embed="rId5"/>
+              </a:ext>
+            </a:extLst>
+          </a:blip>
+          <a:stretch>
+            <a:fillRect/>
+          </a:stretch>
+        </p:blipFill>
+        <p:spPr>
+          <a:xfrm>
+            <a:off x="835651" y="1469314"/>
+            <a:ext cx="381000" cy="381000"/>
+          </a:xfrm>
+          <a:prstGeom prst="rect">
+            <a:avLst/>
+          </a:prstGeom>
+        </p:spPr>
+      </p:pic>
+      <p:sp>
+        <p:nvSpPr>
+          <p:cNvPr id="8" name="Rectangle 7">
+            <a:extLst>
+              <a:ext uri="{FF2B5EF4-FFF2-40B4-BE49-F238E27FC236}">
+                <a16:creationId xmlns:a16="http://schemas.microsoft.com/office/drawing/2014/main" id="{53A2D0C5-00E4-4608-849F-7FF76D7368B7}"/>
+              </a:ext>
+            </a:extLst>
+          </p:cNvPr>
+          <p:cNvSpPr/>
+          <p:nvPr/>
+        </p:nvSpPr>
+        <p:spPr>
+          <a:xfrm>
+            <a:off x="1289593" y="1088314"/>
+            <a:ext cx="2083959" cy="4662781"/>
+          </a:xfrm>
+          <a:prstGeom prst="rect">
+            <a:avLst/>
+          </a:prstGeom>
+          <a:noFill/>
+          <a:ln w="12700">
+            <a:solidFill>
+              <a:srgbClr val="5B9CD5"/>
+            </a:solidFill>
+            <a:prstDash val="dash"/>
+          </a:ln>
+        </p:spPr>
+        <p:style>
+          <a:lnRef idx="2">
+            <a:schemeClr val="accent1">
+              <a:shade val="50000"/>
+            </a:schemeClr>
+          </a:lnRef>
+          <a:fillRef idx="1">
+            <a:schemeClr val="accent1"/>
+          </a:fillRef>
+          <a:effectRef idx="0">
+            <a:schemeClr val="accent1"/>
+          </a:effectRef>
+          <a:fontRef idx="minor">
+            <a:schemeClr val="lt1"/>
+          </a:fontRef>
+        </p:style>
+        <p:txBody>
+          <a:bodyPr tIns="91440"/>
+          <a:lstStyle/>
+          <a:p>
+            <a:pPr algn="ctr" eaLnBrk="1" fontAlgn="auto" hangingPunct="1">
+              <a:spcBef>
+                <a:spcPts val="0"/>
+              </a:spcBef>
+              <a:spcAft>
+                <a:spcPts val="0"/>
+              </a:spcAft>
+              <a:defRPr/>
+            </a:pPr>
+            <a:r>
+              <a:rPr lang="en-US" sz="1200" dirty="0">
+                <a:solidFill>
+                  <a:srgbClr val="5B9CD5"/>
+                </a:solidFill>
+                <a:latin typeface="Arial" panose="020B0604020202020204" pitchFamily="34" charset="0"/>
+                <a:cs typeface="Arial" panose="020B0604020202020204" pitchFamily="34" charset="0"/>
+              </a:rPr>
+              <a:t>Availability Zone 1</a:t>
+            </a:r>
+          </a:p>
+        </p:txBody>
+      </p:sp>
+      <p:pic>
+        <p:nvPicPr>
+          <p:cNvPr id="10" name="Graphic 17">
+            <a:extLst>
+              <a:ext uri="{FF2B5EF4-FFF2-40B4-BE49-F238E27FC236}">
+                <a16:creationId xmlns:a16="http://schemas.microsoft.com/office/drawing/2014/main" id="{33F7D404-AC8F-4B6A-AD39-E8CF76D26C49}"/>
+              </a:ext>
+            </a:extLst>
+          </p:cNvPr>
+          <p:cNvPicPr>
+            <a:picLocks noChangeAspect="1" noChangeArrowheads="1"/>
+          </p:cNvPicPr>
+          <p:nvPr/>
+        </p:nvPicPr>
+        <p:blipFill>
+          <a:blip r:embed="rId6">
+            <a:extLst>
+              <a:ext uri="{28A0092B-C50C-407E-A947-70E740481C1C}">
+                <a14:useLocalDpi xmlns:a14="http://schemas.microsoft.com/office/drawing/2010/main" val="0"/>
+              </a:ext>
+            </a:extLst>
+          </a:blip>
+          <a:srcRect/>
+          <a:stretch>
+            <a:fillRect/>
+          </a:stretch>
+        </p:blipFill>
+        <p:spPr bwMode="auto">
+          <a:xfrm>
+            <a:off x="7355203" y="2274456"/>
+            <a:ext cx="762000" cy="762000"/>
+          </a:xfrm>
+          <a:prstGeom prst="rect">
+            <a:avLst/>
+          </a:prstGeom>
+          <a:noFill/>
+          <a:ln>
             <a:noFill/>
-            <a:ln w="12700">
-              <a:solidFill>
-                <a:schemeClr val="tx1"/>
-              </a:solidFill>
-            </a:ln>
-          </p:spPr>
-          <p:style>
-            <a:lnRef idx="2">
-              <a:schemeClr val="accent1">
-                <a:shade val="50000"/>
-              </a:schemeClr>
-            </a:lnRef>
-            <a:fillRef idx="1">
-              <a:schemeClr val="accent1"/>
-            </a:fillRef>
-            <a:effectRef idx="0">
-              <a:schemeClr val="accent1"/>
-            </a:effectRef>
-            <a:fontRef idx="minor">
-              <a:schemeClr val="lt1"/>
-            </a:fontRef>
-          </p:style>
-          <p:txBody>
-            <a:bodyPr lIns="502920" tIns="91440"/>
-            <a:lstStyle/>
-            <a:p>
-              <a:pPr eaLnBrk="1" fontAlgn="auto" hangingPunct="1">
-                <a:spcBef>
-                  <a:spcPts val="0"/>
-                </a:spcBef>
-                <a:spcAft>
-                  <a:spcPts val="0"/>
-                </a:spcAft>
-                <a:defRPr/>
-              </a:pPr>
-              <a:r>
-                <a:rPr lang="en-US" sz="1200" dirty="0">
-                  <a:solidFill>
-                    <a:sysClr val="windowText" lastClr="000000"/>
-                  </a:solidFill>
-                  <a:latin typeface="Arial" panose="020B0604020202020204" pitchFamily="34" charset="0"/>
-                  <a:cs typeface="Arial" panose="020B0604020202020204" pitchFamily="34" charset="0"/>
-                </a:rPr>
-                <a:t>AWS Cloud</a:t>
-              </a:r>
-            </a:p>
-          </p:txBody>
-        </p:sp>
-        <p:pic>
-          <p:nvPicPr>
-            <p:cNvPr id="5" name="Graphic 4">
-              <a:extLst>
-                <a:ext uri="{FF2B5EF4-FFF2-40B4-BE49-F238E27FC236}">
-                  <a16:creationId xmlns:a16="http://schemas.microsoft.com/office/drawing/2014/main" id="{327654EB-06D6-4B35-901C-E2CAB9C88356}"/>
-                </a:ext>
-              </a:extLst>
-            </p:cNvPr>
-            <p:cNvPicPr>
-              <a:picLocks noChangeAspect="1"/>
-            </p:cNvPicPr>
-            <p:nvPr/>
-          </p:nvPicPr>
-          <p:blipFill>
-            <a:blip r:embed="rId2">
-              <a:extLst>
-                <a:ext uri="{96DAC541-7B7A-43D3-8B79-37D633B846F1}">
-                  <asvg:svgBlip xmlns:asvg="http://schemas.microsoft.com/office/drawing/2016/SVG/main" r:embed="rId3"/>
-                </a:ext>
-              </a:extLst>
-            </a:blip>
-            <a:srcRect/>
-            <a:stretch/>
-          </p:blipFill>
-          <p:spPr>
-            <a:xfrm>
-              <a:off x="614855" y="707315"/>
-              <a:ext cx="381000" cy="381000"/>
-            </a:xfrm>
-            <a:prstGeom prst="rect">
-              <a:avLst/>
-            </a:prstGeom>
-          </p:spPr>
-        </p:pic>
-        <p:sp>
-          <p:nvSpPr>
-            <p:cNvPr id="6" name="Rectangle 5">
-              <a:extLst>
-                <a:ext uri="{FF2B5EF4-FFF2-40B4-BE49-F238E27FC236}">
-                  <a16:creationId xmlns:a16="http://schemas.microsoft.com/office/drawing/2014/main" id="{5E46EA62-888D-48CF-B302-1596DD0CD665}"/>
-                </a:ext>
-              </a:extLst>
-            </p:cNvPr>
-            <p:cNvSpPr/>
-            <p:nvPr/>
-          </p:nvSpPr>
-          <p:spPr>
-            <a:xfrm>
-              <a:off x="836358" y="1469314"/>
-              <a:ext cx="8022416" cy="3378583"/>
-            </a:xfrm>
-            <a:prstGeom prst="rect">
-              <a:avLst/>
-            </a:prstGeom>
+          </a:ln>
+          <a:extLst>
+            <a:ext uri="{909E8E84-426E-40DD-AFC4-6F175D3DCCD1}">
+              <a14:hiddenFill xmlns:a14="http://schemas.microsoft.com/office/drawing/2010/main">
+                <a:solidFill>
+                  <a:srgbClr val="FFFFFF"/>
+                </a:solidFill>
+              </a14:hiddenFill>
+            </a:ext>
+            <a:ext uri="{91240B29-F687-4F45-9708-019B960494DF}">
+              <a14:hiddenLine xmlns:a14="http://schemas.microsoft.com/office/drawing/2010/main" w="9525">
+                <a:solidFill>
+                  <a:srgbClr val="000000"/>
+                </a:solidFill>
+                <a:miter lim="800000"/>
+                <a:headEnd/>
+                <a:tailEnd/>
+              </a14:hiddenLine>
+            </a:ext>
+          </a:extLst>
+        </p:spPr>
+      </p:pic>
+      <p:sp>
+        <p:nvSpPr>
+          <p:cNvPr id="14" name="Rectangle 13">
+            <a:extLst>
+              <a:ext uri="{FF2B5EF4-FFF2-40B4-BE49-F238E27FC236}">
+                <a16:creationId xmlns:a16="http://schemas.microsoft.com/office/drawing/2014/main" id="{F21CD9A0-BD45-4DC9-B89B-350515829B63}"/>
+              </a:ext>
+            </a:extLst>
+          </p:cNvPr>
+          <p:cNvSpPr/>
+          <p:nvPr/>
+        </p:nvSpPr>
+        <p:spPr>
+          <a:xfrm>
+            <a:off x="1444978" y="1850313"/>
+            <a:ext cx="1807399" cy="2504774"/>
+          </a:xfrm>
+          <a:prstGeom prst="rect">
+            <a:avLst/>
+          </a:prstGeom>
+          <a:solidFill>
+            <a:srgbClr val="1D8900">
+              <a:alpha val="9804"/>
+            </a:srgbClr>
+          </a:solidFill>
+          <a:ln w="12700">
             <a:noFill/>
-            <a:ln w="12700">
-              <a:solidFill>
-                <a:srgbClr val="1E8900"/>
-              </a:solidFill>
-            </a:ln>
-          </p:spPr>
-          <p:style>
-            <a:lnRef idx="2">
-              <a:schemeClr val="accent1">
-                <a:shade val="50000"/>
-              </a:schemeClr>
-            </a:lnRef>
-            <a:fillRef idx="1">
-              <a:schemeClr val="accent1"/>
-            </a:fillRef>
-            <a:effectRef idx="0">
-              <a:schemeClr val="accent1"/>
-            </a:effectRef>
-            <a:fontRef idx="minor">
-              <a:schemeClr val="lt1"/>
-            </a:fontRef>
-          </p:style>
-          <p:txBody>
-            <a:bodyPr lIns="502920" tIns="91440"/>
-            <a:lstStyle/>
-            <a:p>
-              <a:pPr eaLnBrk="1" fontAlgn="auto" hangingPunct="1">
-                <a:spcBef>
-                  <a:spcPts val="0"/>
-                </a:spcBef>
-                <a:spcAft>
-                  <a:spcPts val="0"/>
-                </a:spcAft>
-                <a:defRPr/>
-              </a:pPr>
-              <a:r>
-                <a:rPr lang="en-US" sz="1200" dirty="0">
-                  <a:ln w="0"/>
-                  <a:solidFill>
-                    <a:srgbClr val="1E8900"/>
-                  </a:solidFill>
-                  <a:latin typeface="Arial" panose="020B0604020202020204" pitchFamily="34" charset="0"/>
-                  <a:cs typeface="Arial" panose="020B0604020202020204" pitchFamily="34" charset="0"/>
-                </a:rPr>
-                <a:t>VPC</a:t>
-              </a:r>
-            </a:p>
-          </p:txBody>
-        </p:sp>
-        <p:pic>
-          <p:nvPicPr>
-            <p:cNvPr id="7" name="Graphic 6">
-              <a:extLst>
-                <a:ext uri="{FF2B5EF4-FFF2-40B4-BE49-F238E27FC236}">
-                  <a16:creationId xmlns:a16="http://schemas.microsoft.com/office/drawing/2014/main" id="{12F870B0-EEA9-49B3-A6FB-6D6E08989340}"/>
-                </a:ext>
-              </a:extLst>
-            </p:cNvPr>
-            <p:cNvPicPr>
-              <a:picLocks noChangeAspect="1"/>
-            </p:cNvPicPr>
-            <p:nvPr/>
-          </p:nvPicPr>
-          <p:blipFill>
-            <a:blip r:embed="rId4">
-              <a:extLst>
-                <a:ext uri="{96DAC541-7B7A-43D3-8B79-37D633B846F1}">
-                  <asvg:svgBlip xmlns:asvg="http://schemas.microsoft.com/office/drawing/2016/SVG/main" r:embed="rId5"/>
-                </a:ext>
-              </a:extLst>
-            </a:blip>
-            <a:stretch>
-              <a:fillRect/>
-            </a:stretch>
-          </p:blipFill>
-          <p:spPr>
-            <a:xfrm>
-              <a:off x="835651" y="1469314"/>
-              <a:ext cx="381000" cy="381000"/>
-            </a:xfrm>
-            <a:prstGeom prst="rect">
-              <a:avLst/>
-            </a:prstGeom>
-          </p:spPr>
-        </p:pic>
-        <p:sp>
-          <p:nvSpPr>
-            <p:cNvPr id="8" name="Rectangle 7">
-              <a:extLst>
-                <a:ext uri="{FF2B5EF4-FFF2-40B4-BE49-F238E27FC236}">
-                  <a16:creationId xmlns:a16="http://schemas.microsoft.com/office/drawing/2014/main" id="{53A2D0C5-00E4-4608-849F-7FF76D7368B7}"/>
-                </a:ext>
-              </a:extLst>
-            </p:cNvPr>
-            <p:cNvSpPr/>
-            <p:nvPr/>
-          </p:nvSpPr>
-          <p:spPr>
-            <a:xfrm>
-              <a:off x="1289593" y="1088314"/>
-              <a:ext cx="2977336" cy="3909355"/>
-            </a:xfrm>
-            <a:prstGeom prst="rect">
-              <a:avLst/>
-            </a:prstGeom>
+            <a:prstDash val="dash"/>
+          </a:ln>
+        </p:spPr>
+        <p:style>
+          <a:lnRef idx="2">
+            <a:schemeClr val="accent1">
+              <a:shade val="50000"/>
+            </a:schemeClr>
+          </a:lnRef>
+          <a:fillRef idx="1">
+            <a:schemeClr val="accent1"/>
+          </a:fillRef>
+          <a:effectRef idx="0">
+            <a:schemeClr val="accent1"/>
+          </a:effectRef>
+          <a:fontRef idx="minor">
+            <a:schemeClr val="lt1"/>
+          </a:fontRef>
+        </p:style>
+        <p:txBody>
+          <a:bodyPr lIns="502920"/>
+          <a:lstStyle/>
+          <a:p>
+            <a:pPr eaLnBrk="1" fontAlgn="auto" hangingPunct="1">
+              <a:spcBef>
+                <a:spcPts val="0"/>
+              </a:spcBef>
+              <a:spcAft>
+                <a:spcPts val="0"/>
+              </a:spcAft>
+              <a:defRPr/>
+            </a:pPr>
+            <a:r>
+              <a:rPr lang="en-US" sz="1200" dirty="0">
+                <a:solidFill>
+                  <a:srgbClr val="1E8900"/>
+                </a:solidFill>
+                <a:latin typeface="Arial" panose="020B0604020202020204" pitchFamily="34" charset="0"/>
+                <a:cs typeface="Arial" panose="020B0604020202020204" pitchFamily="34" charset="0"/>
+              </a:rPr>
+              <a:t>Public subnet</a:t>
+            </a:r>
+          </a:p>
+        </p:txBody>
+      </p:sp>
+      <p:pic>
+        <p:nvPicPr>
+          <p:cNvPr id="15" name="Graphic 14">
+            <a:extLst>
+              <a:ext uri="{FF2B5EF4-FFF2-40B4-BE49-F238E27FC236}">
+                <a16:creationId xmlns:a16="http://schemas.microsoft.com/office/drawing/2014/main" id="{7B498B08-B788-4613-8E73-49F47FD39E27}"/>
+              </a:ext>
+            </a:extLst>
+          </p:cNvPr>
+          <p:cNvPicPr>
+            <a:picLocks noChangeAspect="1"/>
+          </p:cNvPicPr>
+          <p:nvPr/>
+        </p:nvPicPr>
+        <p:blipFill>
+          <a:blip r:embed="rId7">
+            <a:extLst>
+              <a:ext uri="{96DAC541-7B7A-43D3-8B79-37D633B846F1}">
+                <asvg:svgBlip xmlns:asvg="http://schemas.microsoft.com/office/drawing/2016/SVG/main" r:embed="rId8"/>
+              </a:ext>
+            </a:extLst>
+          </a:blip>
+          <a:stretch>
+            <a:fillRect/>
+          </a:stretch>
+        </p:blipFill>
+        <p:spPr>
+          <a:xfrm>
+            <a:off x="1444979" y="1850314"/>
+            <a:ext cx="381000" cy="381000"/>
+          </a:xfrm>
+          <a:prstGeom prst="rect">
+            <a:avLst/>
+          </a:prstGeom>
+        </p:spPr>
+      </p:pic>
+      <p:sp>
+        <p:nvSpPr>
+          <p:cNvPr id="16" name="Rectangle 15">
+            <a:extLst>
+              <a:ext uri="{FF2B5EF4-FFF2-40B4-BE49-F238E27FC236}">
+                <a16:creationId xmlns:a16="http://schemas.microsoft.com/office/drawing/2014/main" id="{A38A1231-6F42-4400-A7EB-D1642D6C3884}"/>
+              </a:ext>
+            </a:extLst>
+          </p:cNvPr>
+          <p:cNvSpPr/>
+          <p:nvPr/>
+        </p:nvSpPr>
+        <p:spPr>
+          <a:xfrm>
+            <a:off x="1444979" y="4515508"/>
+            <a:ext cx="1807398" cy="937496"/>
+          </a:xfrm>
+          <a:prstGeom prst="rect">
+            <a:avLst/>
+          </a:prstGeom>
+          <a:solidFill>
+            <a:srgbClr val="007CBC">
+              <a:alpha val="9804"/>
+            </a:srgbClr>
+          </a:solidFill>
+          <a:ln w="12700">
             <a:noFill/>
-            <a:ln w="12700">
-              <a:solidFill>
-                <a:srgbClr val="5B9CD5"/>
-              </a:solidFill>
-              <a:prstDash val="dash"/>
-            </a:ln>
-          </p:spPr>
-          <p:style>
-            <a:lnRef idx="2">
-              <a:schemeClr val="accent1">
-                <a:shade val="50000"/>
-              </a:schemeClr>
-            </a:lnRef>
-            <a:fillRef idx="1">
-              <a:schemeClr val="accent1"/>
-            </a:fillRef>
-            <a:effectRef idx="0">
-              <a:schemeClr val="accent1"/>
-            </a:effectRef>
-            <a:fontRef idx="minor">
-              <a:schemeClr val="lt1"/>
-            </a:fontRef>
-          </p:style>
-          <p:txBody>
-            <a:bodyPr tIns="91440"/>
-            <a:lstStyle/>
-            <a:p>
-              <a:pPr algn="ctr" eaLnBrk="1" fontAlgn="auto" hangingPunct="1">
-                <a:spcBef>
-                  <a:spcPts val="0"/>
-                </a:spcBef>
-                <a:spcAft>
-                  <a:spcPts val="0"/>
-                </a:spcAft>
-                <a:defRPr/>
-              </a:pPr>
-              <a:r>
-                <a:rPr lang="en-US" sz="1200" dirty="0">
-                  <a:solidFill>
-                    <a:srgbClr val="5B9CD5"/>
-                  </a:solidFill>
-                  <a:latin typeface="Arial" panose="020B0604020202020204" pitchFamily="34" charset="0"/>
-                  <a:cs typeface="Arial" panose="020B0604020202020204" pitchFamily="34" charset="0"/>
-                </a:rPr>
-                <a:t>Availability Zone 1</a:t>
-              </a:r>
-            </a:p>
-          </p:txBody>
-        </p:sp>
-        <p:sp>
-          <p:nvSpPr>
-            <p:cNvPr id="9" name="Rectangle 8">
-              <a:extLst>
-                <a:ext uri="{FF2B5EF4-FFF2-40B4-BE49-F238E27FC236}">
-                  <a16:creationId xmlns:a16="http://schemas.microsoft.com/office/drawing/2014/main" id="{767FC93C-DF9B-42B8-BCB0-CCA5B0768FE7}"/>
-                </a:ext>
-              </a:extLst>
-            </p:cNvPr>
-            <p:cNvSpPr/>
-            <p:nvPr/>
-          </p:nvSpPr>
-          <p:spPr>
-            <a:xfrm>
-              <a:off x="5693328" y="1088315"/>
-              <a:ext cx="2977336" cy="3909354"/>
-            </a:xfrm>
-            <a:prstGeom prst="rect">
-              <a:avLst/>
-            </a:prstGeom>
+            <a:prstDash val="dash"/>
+          </a:ln>
+        </p:spPr>
+        <p:style>
+          <a:lnRef idx="2">
+            <a:schemeClr val="accent1">
+              <a:shade val="50000"/>
+            </a:schemeClr>
+          </a:lnRef>
+          <a:fillRef idx="1">
+            <a:schemeClr val="accent1"/>
+          </a:fillRef>
+          <a:effectRef idx="0">
+            <a:schemeClr val="accent1"/>
+          </a:effectRef>
+          <a:fontRef idx="minor">
+            <a:schemeClr val="lt1"/>
+          </a:fontRef>
+        </p:style>
+        <p:txBody>
+          <a:bodyPr lIns="502920"/>
+          <a:lstStyle/>
+          <a:p>
+            <a:pPr eaLnBrk="1" fontAlgn="auto" hangingPunct="1">
+              <a:spcBef>
+                <a:spcPts val="0"/>
+              </a:spcBef>
+              <a:spcAft>
+                <a:spcPts val="0"/>
+              </a:spcAft>
+              <a:defRPr/>
+            </a:pPr>
+            <a:r>
+              <a:rPr lang="en-US" sz="1200" dirty="0">
+                <a:solidFill>
+                  <a:srgbClr val="5B9CD5"/>
+                </a:solidFill>
+                <a:latin typeface="Arial" panose="020B0604020202020204" pitchFamily="34" charset="0"/>
+                <a:cs typeface="Arial" panose="020B0604020202020204" pitchFamily="34" charset="0"/>
+              </a:rPr>
+              <a:t>Private subnet</a:t>
+            </a:r>
+          </a:p>
+        </p:txBody>
+      </p:sp>
+      <p:pic>
+        <p:nvPicPr>
+          <p:cNvPr id="17" name="Graphic 16">
+            <a:extLst>
+              <a:ext uri="{FF2B5EF4-FFF2-40B4-BE49-F238E27FC236}">
+                <a16:creationId xmlns:a16="http://schemas.microsoft.com/office/drawing/2014/main" id="{8DAADE7C-E81F-4841-B397-E41F1A29D58A}"/>
+              </a:ext>
+            </a:extLst>
+          </p:cNvPr>
+          <p:cNvPicPr>
+            <a:picLocks noChangeAspect="1"/>
+          </p:cNvPicPr>
+          <p:nvPr/>
+        </p:nvPicPr>
+        <p:blipFill>
+          <a:blip r:embed="rId9">
+            <a:extLst>
+              <a:ext uri="{96DAC541-7B7A-43D3-8B79-37D633B846F1}">
+                <asvg:svgBlip xmlns:asvg="http://schemas.microsoft.com/office/drawing/2016/SVG/main" r:embed="rId10"/>
+              </a:ext>
+            </a:extLst>
+          </a:blip>
+          <a:stretch>
+            <a:fillRect/>
+          </a:stretch>
+        </p:blipFill>
+        <p:spPr>
+          <a:xfrm>
+            <a:off x="1444978" y="4515508"/>
+            <a:ext cx="381000" cy="381000"/>
+          </a:xfrm>
+          <a:prstGeom prst="rect">
+            <a:avLst/>
+          </a:prstGeom>
+        </p:spPr>
+      </p:pic>
+      <p:sp>
+        <p:nvSpPr>
+          <p:cNvPr id="22" name="TextBox 17">
+            <a:extLst>
+              <a:ext uri="{FF2B5EF4-FFF2-40B4-BE49-F238E27FC236}">
+                <a16:creationId xmlns:a16="http://schemas.microsoft.com/office/drawing/2014/main" id="{CEE25E96-A84C-434F-8C60-7C01FA69CAF4}"/>
+              </a:ext>
+            </a:extLst>
+          </p:cNvPr>
+          <p:cNvSpPr txBox="1">
+            <a:spLocks noChangeArrowheads="1"/>
+          </p:cNvSpPr>
+          <p:nvPr/>
+        </p:nvSpPr>
+        <p:spPr bwMode="auto">
+          <a:xfrm>
+            <a:off x="1732600" y="2803298"/>
+            <a:ext cx="1234766" cy="261610"/>
+          </a:xfrm>
+          <a:prstGeom prst="rect">
+            <a:avLst/>
+          </a:prstGeom>
+          <a:noFill/>
+          <a:ln>
             <a:noFill/>
-            <a:ln w="12700">
-              <a:solidFill>
-                <a:srgbClr val="5B9CD5"/>
-              </a:solidFill>
-              <a:prstDash val="dash"/>
-            </a:ln>
-          </p:spPr>
-          <p:style>
-            <a:lnRef idx="2">
-              <a:schemeClr val="accent1">
-                <a:shade val="50000"/>
-              </a:schemeClr>
-            </a:lnRef>
-            <a:fillRef idx="1">
-              <a:schemeClr val="accent1"/>
-            </a:fillRef>
-            <a:effectRef idx="0">
-              <a:schemeClr val="accent1"/>
-            </a:effectRef>
-            <a:fontRef idx="minor">
-              <a:schemeClr val="lt1"/>
-            </a:fontRef>
-          </p:style>
-          <p:txBody>
-            <a:bodyPr tIns="91440"/>
-            <a:lstStyle/>
-            <a:p>
-              <a:pPr algn="ctr" eaLnBrk="1" fontAlgn="auto" hangingPunct="1">
-                <a:spcBef>
-                  <a:spcPts val="0"/>
-                </a:spcBef>
-                <a:spcAft>
-                  <a:spcPts val="0"/>
-                </a:spcAft>
-                <a:defRPr/>
-              </a:pPr>
-              <a:r>
-                <a:rPr lang="en-US" sz="1200" dirty="0">
-                  <a:solidFill>
-                    <a:srgbClr val="5B9CD5"/>
-                  </a:solidFill>
-                  <a:latin typeface="Arial" panose="020B0604020202020204" pitchFamily="34" charset="0"/>
-                  <a:cs typeface="Arial" panose="020B0604020202020204" pitchFamily="34" charset="0"/>
-                </a:rPr>
-                <a:t>Availability Zone 2</a:t>
-              </a:r>
-            </a:p>
-          </p:txBody>
-        </p:sp>
-        <p:pic>
-          <p:nvPicPr>
-            <p:cNvPr id="10" name="Graphic 17">
-              <a:extLst>
-                <a:ext uri="{FF2B5EF4-FFF2-40B4-BE49-F238E27FC236}">
-                  <a16:creationId xmlns:a16="http://schemas.microsoft.com/office/drawing/2014/main" id="{33F7D404-AC8F-4B6A-AD39-E8CF76D26C49}"/>
-                </a:ext>
-              </a:extLst>
-            </p:cNvPr>
-            <p:cNvPicPr>
-              <a:picLocks noChangeAspect="1" noChangeArrowheads="1"/>
-            </p:cNvPicPr>
-            <p:nvPr/>
-          </p:nvPicPr>
-          <p:blipFill>
-            <a:blip r:embed="rId6">
-              <a:extLst>
-                <a:ext uri="{28A0092B-C50C-407E-A947-70E740481C1C}">
-                  <a14:useLocalDpi xmlns:a14="http://schemas.microsoft.com/office/drawing/2010/main" val="0"/>
-                </a:ext>
-              </a:extLst>
-            </a:blip>
-            <a:srcRect/>
-            <a:stretch>
-              <a:fillRect/>
-            </a:stretch>
-          </p:blipFill>
-          <p:spPr bwMode="auto">
-            <a:xfrm>
-              <a:off x="9175980" y="1961637"/>
-              <a:ext cx="762000" cy="762000"/>
-            </a:xfrm>
-            <a:prstGeom prst="rect">
-              <a:avLst/>
-            </a:prstGeom>
+          </a:ln>
+          <a:extLst>
+            <a:ext uri="{909E8E84-426E-40DD-AFC4-6F175D3DCCD1}">
+              <a14:hiddenFill xmlns:a14="http://schemas.microsoft.com/office/drawing/2010/main">
+                <a:solidFill>
+                  <a:srgbClr val="FFFFFF"/>
+                </a:solidFill>
+              </a14:hiddenFill>
+            </a:ext>
+            <a:ext uri="{91240B29-F687-4F45-9708-019B960494DF}">
+              <a14:hiddenLine xmlns:a14="http://schemas.microsoft.com/office/drawing/2010/main" w="9525">
+                <a:solidFill>
+                  <a:srgbClr val="000000"/>
+                </a:solidFill>
+                <a:miter lim="800000"/>
+                <a:headEnd/>
+                <a:tailEnd/>
+              </a14:hiddenLine>
+            </a:ext>
+          </a:extLst>
+        </p:spPr>
+        <p:txBody>
+          <a:bodyPr wrap="square">
+            <a:spAutoFit/>
+          </a:bodyPr>
+          <a:lstStyle>
+            <a:lvl1pPr>
+              <a:defRPr>
+                <a:solidFill>
+                  <a:schemeClr val="tx1"/>
+                </a:solidFill>
+                <a:latin typeface="Calibri" panose="020F0502020204030204" pitchFamily="34" charset="0"/>
+              </a:defRPr>
+            </a:lvl1pPr>
+            <a:lvl2pPr marL="742950" indent="-285750">
+              <a:defRPr>
+                <a:solidFill>
+                  <a:schemeClr val="tx1"/>
+                </a:solidFill>
+                <a:latin typeface="Calibri" panose="020F0502020204030204" pitchFamily="34" charset="0"/>
+              </a:defRPr>
+            </a:lvl2pPr>
+            <a:lvl3pPr marL="1143000" indent="-228600">
+              <a:defRPr>
+                <a:solidFill>
+                  <a:schemeClr val="tx1"/>
+                </a:solidFill>
+                <a:latin typeface="Calibri" panose="020F0502020204030204" pitchFamily="34" charset="0"/>
+              </a:defRPr>
+            </a:lvl3pPr>
+            <a:lvl4pPr marL="1600200" indent="-228600">
+              <a:defRPr>
+                <a:solidFill>
+                  <a:schemeClr val="tx1"/>
+                </a:solidFill>
+                <a:latin typeface="Calibri" panose="020F0502020204030204" pitchFamily="34" charset="0"/>
+              </a:defRPr>
+            </a:lvl4pPr>
+            <a:lvl5pPr marL="2057400" indent="-228600">
+              <a:defRPr>
+                <a:solidFill>
+                  <a:schemeClr val="tx1"/>
+                </a:solidFill>
+                <a:latin typeface="Calibri" panose="020F0502020204030204" pitchFamily="34" charset="0"/>
+              </a:defRPr>
+            </a:lvl5pPr>
+            <a:lvl6pPr marL="2514600" indent="-228600" eaLnBrk="0" fontAlgn="base" hangingPunct="0">
+              <a:spcBef>
+                <a:spcPct val="0"/>
+              </a:spcBef>
+              <a:spcAft>
+                <a:spcPct val="0"/>
+              </a:spcAft>
+              <a:defRPr>
+                <a:solidFill>
+                  <a:schemeClr val="tx1"/>
+                </a:solidFill>
+                <a:latin typeface="Calibri" panose="020F0502020204030204" pitchFamily="34" charset="0"/>
+              </a:defRPr>
+            </a:lvl6pPr>
+            <a:lvl7pPr marL="2971800" indent="-228600" eaLnBrk="0" fontAlgn="base" hangingPunct="0">
+              <a:spcBef>
+                <a:spcPct val="0"/>
+              </a:spcBef>
+              <a:spcAft>
+                <a:spcPct val="0"/>
+              </a:spcAft>
+              <a:defRPr>
+                <a:solidFill>
+                  <a:schemeClr val="tx1"/>
+                </a:solidFill>
+                <a:latin typeface="Calibri" panose="020F0502020204030204" pitchFamily="34" charset="0"/>
+              </a:defRPr>
+            </a:lvl7pPr>
+            <a:lvl8pPr marL="3429000" indent="-228600" eaLnBrk="0" fontAlgn="base" hangingPunct="0">
+              <a:spcBef>
+                <a:spcPct val="0"/>
+              </a:spcBef>
+              <a:spcAft>
+                <a:spcPct val="0"/>
+              </a:spcAft>
+              <a:defRPr>
+                <a:solidFill>
+                  <a:schemeClr val="tx1"/>
+                </a:solidFill>
+                <a:latin typeface="Calibri" panose="020F0502020204030204" pitchFamily="34" charset="0"/>
+              </a:defRPr>
+            </a:lvl8pPr>
+            <a:lvl9pPr marL="3886200" indent="-228600" eaLnBrk="0" fontAlgn="base" hangingPunct="0">
+              <a:spcBef>
+                <a:spcPct val="0"/>
+              </a:spcBef>
+              <a:spcAft>
+                <a:spcPct val="0"/>
+              </a:spcAft>
+              <a:defRPr>
+                <a:solidFill>
+                  <a:schemeClr val="tx1"/>
+                </a:solidFill>
+                <a:latin typeface="Calibri" panose="020F0502020204030204" pitchFamily="34" charset="0"/>
+              </a:defRPr>
+            </a:lvl9pPr>
+          </a:lstStyle>
+          <a:p>
+            <a:pPr algn="ctr" eaLnBrk="1" hangingPunct="1"/>
+            <a:r>
+              <a:rPr lang="en-US" altLang="en-US" sz="1100" dirty="0">
+                <a:latin typeface="Arial" panose="020B0604020202020204" pitchFamily="34" charset="0"/>
+                <a:ea typeface="Amazon Ember" panose="020B0603020204020204" pitchFamily="34" charset="0"/>
+                <a:cs typeface="Arial" panose="020B0604020202020204" pitchFamily="34" charset="0"/>
+              </a:rPr>
+              <a:t>NAT gateway</a:t>
+            </a:r>
+          </a:p>
+        </p:txBody>
+      </p:sp>
+      <p:pic>
+        <p:nvPicPr>
+          <p:cNvPr id="23" name="Graphic 35">
+            <a:extLst>
+              <a:ext uri="{FF2B5EF4-FFF2-40B4-BE49-F238E27FC236}">
+                <a16:creationId xmlns:a16="http://schemas.microsoft.com/office/drawing/2014/main" id="{33F1CD08-48FF-4EFD-81EE-58132E2E8C29}"/>
+              </a:ext>
+            </a:extLst>
+          </p:cNvPr>
+          <p:cNvPicPr>
+            <a:picLocks noChangeAspect="1" noChangeArrowheads="1"/>
+          </p:cNvPicPr>
+          <p:nvPr/>
+        </p:nvPicPr>
+        <p:blipFill>
+          <a:blip r:embed="rId11">
+            <a:extLst>
+              <a:ext uri="{28A0092B-C50C-407E-A947-70E740481C1C}">
+                <a14:useLocalDpi xmlns:a14="http://schemas.microsoft.com/office/drawing/2010/main" val="0"/>
+              </a:ext>
+            </a:extLst>
+          </a:blip>
+          <a:srcRect/>
+          <a:stretch>
+            <a:fillRect/>
+          </a:stretch>
+        </p:blipFill>
+        <p:spPr bwMode="auto">
+          <a:xfrm>
+            <a:off x="2127659" y="2358447"/>
+            <a:ext cx="457200" cy="457200"/>
+          </a:xfrm>
+          <a:prstGeom prst="rect">
+            <a:avLst/>
+          </a:prstGeom>
+          <a:noFill/>
+          <a:ln>
             <a:noFill/>
-            <a:ln>
-              <a:noFill/>
-            </a:ln>
-            <a:extLst>
-              <a:ext uri="{909E8E84-426E-40DD-AFC4-6F175D3DCCD1}">
-                <a14:hiddenFill xmlns:a14="http://schemas.microsoft.com/office/drawing/2010/main">
-                  <a:solidFill>
-                    <a:srgbClr val="FFFFFF"/>
-                  </a:solidFill>
-                </a14:hiddenFill>
-              </a:ext>
-              <a:ext uri="{91240B29-F687-4F45-9708-019B960494DF}">
-                <a14:hiddenLine xmlns:a14="http://schemas.microsoft.com/office/drawing/2010/main" w="9525">
-                  <a:solidFill>
-                    <a:srgbClr val="000000"/>
-                  </a:solidFill>
-                  <a:miter lim="800000"/>
-                  <a:headEnd/>
-                  <a:tailEnd/>
-                </a14:hiddenLine>
-              </a:ext>
-            </a:extLst>
-          </p:spPr>
-        </p:pic>
-        <p:sp>
-          <p:nvSpPr>
-            <p:cNvPr id="14" name="Rectangle 13">
-              <a:extLst>
-                <a:ext uri="{FF2B5EF4-FFF2-40B4-BE49-F238E27FC236}">
-                  <a16:creationId xmlns:a16="http://schemas.microsoft.com/office/drawing/2014/main" id="{F21CD9A0-BD45-4DC9-B89B-350515829B63}"/>
-                </a:ext>
-              </a:extLst>
-            </p:cNvPr>
-            <p:cNvSpPr/>
-            <p:nvPr/>
-          </p:nvSpPr>
-          <p:spPr>
-            <a:xfrm>
-              <a:off x="1444978" y="1850313"/>
-              <a:ext cx="2614719" cy="1782989"/>
-            </a:xfrm>
-            <a:prstGeom prst="rect">
-              <a:avLst/>
-            </a:prstGeom>
+          </a:ln>
+          <a:extLst>
+            <a:ext uri="{909E8E84-426E-40DD-AFC4-6F175D3DCCD1}">
+              <a14:hiddenFill xmlns:a14="http://schemas.microsoft.com/office/drawing/2010/main">
+                <a:solidFill>
+                  <a:srgbClr val="FFFFFF"/>
+                </a:solidFill>
+              </a14:hiddenFill>
+            </a:ext>
+            <a:ext uri="{91240B29-F687-4F45-9708-019B960494DF}">
+              <a14:hiddenLine xmlns:a14="http://schemas.microsoft.com/office/drawing/2010/main" w="9525">
+                <a:solidFill>
+                  <a:srgbClr val="000000"/>
+                </a:solidFill>
+                <a:miter lim="800000"/>
+                <a:headEnd/>
+                <a:tailEnd/>
+              </a14:hiddenLine>
+            </a:ext>
+          </a:extLst>
+        </p:spPr>
+      </p:pic>
+      <p:sp>
+        <p:nvSpPr>
+          <p:cNvPr id="27" name="TextBox 16">
+            <a:extLst>
+              <a:ext uri="{FF2B5EF4-FFF2-40B4-BE49-F238E27FC236}">
+                <a16:creationId xmlns:a16="http://schemas.microsoft.com/office/drawing/2014/main" id="{6D31A402-2F3B-4CD6-9860-8AC77529E62B}"/>
+              </a:ext>
+            </a:extLst>
+          </p:cNvPr>
+          <p:cNvSpPr txBox="1">
+            <a:spLocks noChangeArrowheads="1"/>
+          </p:cNvSpPr>
+          <p:nvPr/>
+        </p:nvSpPr>
+        <p:spPr bwMode="auto">
+          <a:xfrm>
+            <a:off x="1683819" y="3823457"/>
+            <a:ext cx="1308033" cy="261610"/>
+          </a:xfrm>
+          <a:prstGeom prst="rect">
+            <a:avLst/>
+          </a:prstGeom>
+          <a:noFill/>
+          <a:ln>
+            <a:noFill/>
+          </a:ln>
+          <a:extLst>
+            <a:ext uri="{909E8E84-426E-40DD-AFC4-6F175D3DCCD1}">
+              <a14:hiddenFill xmlns:a14="http://schemas.microsoft.com/office/drawing/2010/main">
+                <a:solidFill>
+                  <a:srgbClr val="FFFFFF"/>
+                </a:solidFill>
+              </a14:hiddenFill>
+            </a:ext>
+            <a:ext uri="{91240B29-F687-4F45-9708-019B960494DF}">
+              <a14:hiddenLine xmlns:a14="http://schemas.microsoft.com/office/drawing/2010/main" w="9525">
+                <a:solidFill>
+                  <a:srgbClr val="000000"/>
+                </a:solidFill>
+                <a:miter lim="800000"/>
+                <a:headEnd/>
+                <a:tailEnd/>
+              </a14:hiddenLine>
+            </a:ext>
+          </a:extLst>
+        </p:spPr>
+        <p:txBody>
+          <a:bodyPr wrap="square" lIns="0" rIns="0">
+            <a:spAutoFit/>
+          </a:bodyPr>
+          <a:lstStyle>
+            <a:lvl1pPr>
+              <a:defRPr>
+                <a:solidFill>
+                  <a:schemeClr val="tx1"/>
+                </a:solidFill>
+                <a:latin typeface="Calibri" panose="020F0502020204030204" pitchFamily="34" charset="0"/>
+              </a:defRPr>
+            </a:lvl1pPr>
+            <a:lvl2pPr marL="742950" indent="-285750">
+              <a:defRPr>
+                <a:solidFill>
+                  <a:schemeClr val="tx1"/>
+                </a:solidFill>
+                <a:latin typeface="Calibri" panose="020F0502020204030204" pitchFamily="34" charset="0"/>
+              </a:defRPr>
+            </a:lvl2pPr>
+            <a:lvl3pPr marL="1143000" indent="-228600">
+              <a:defRPr>
+                <a:solidFill>
+                  <a:schemeClr val="tx1"/>
+                </a:solidFill>
+                <a:latin typeface="Calibri" panose="020F0502020204030204" pitchFamily="34" charset="0"/>
+              </a:defRPr>
+            </a:lvl3pPr>
+            <a:lvl4pPr marL="1600200" indent="-228600">
+              <a:defRPr>
+                <a:solidFill>
+                  <a:schemeClr val="tx1"/>
+                </a:solidFill>
+                <a:latin typeface="Calibri" panose="020F0502020204030204" pitchFamily="34" charset="0"/>
+              </a:defRPr>
+            </a:lvl4pPr>
+            <a:lvl5pPr marL="2057400" indent="-228600">
+              <a:defRPr>
+                <a:solidFill>
+                  <a:schemeClr val="tx1"/>
+                </a:solidFill>
+                <a:latin typeface="Calibri" panose="020F0502020204030204" pitchFamily="34" charset="0"/>
+              </a:defRPr>
+            </a:lvl5pPr>
+            <a:lvl6pPr marL="2514600" indent="-228600" eaLnBrk="0" fontAlgn="base" hangingPunct="0">
+              <a:spcBef>
+                <a:spcPct val="0"/>
+              </a:spcBef>
+              <a:spcAft>
+                <a:spcPct val="0"/>
+              </a:spcAft>
+              <a:defRPr>
+                <a:solidFill>
+                  <a:schemeClr val="tx1"/>
+                </a:solidFill>
+                <a:latin typeface="Calibri" panose="020F0502020204030204" pitchFamily="34" charset="0"/>
+              </a:defRPr>
+            </a:lvl6pPr>
+            <a:lvl7pPr marL="2971800" indent="-228600" eaLnBrk="0" fontAlgn="base" hangingPunct="0">
+              <a:spcBef>
+                <a:spcPct val="0"/>
+              </a:spcBef>
+              <a:spcAft>
+                <a:spcPct val="0"/>
+              </a:spcAft>
+              <a:defRPr>
+                <a:solidFill>
+                  <a:schemeClr val="tx1"/>
+                </a:solidFill>
+                <a:latin typeface="Calibri" panose="020F0502020204030204" pitchFamily="34" charset="0"/>
+              </a:defRPr>
+            </a:lvl7pPr>
+            <a:lvl8pPr marL="3429000" indent="-228600" eaLnBrk="0" fontAlgn="base" hangingPunct="0">
+              <a:spcBef>
+                <a:spcPct val="0"/>
+              </a:spcBef>
+              <a:spcAft>
+                <a:spcPct val="0"/>
+              </a:spcAft>
+              <a:defRPr>
+                <a:solidFill>
+                  <a:schemeClr val="tx1"/>
+                </a:solidFill>
+                <a:latin typeface="Calibri" panose="020F0502020204030204" pitchFamily="34" charset="0"/>
+              </a:defRPr>
+            </a:lvl8pPr>
+            <a:lvl9pPr marL="3886200" indent="-228600" eaLnBrk="0" fontAlgn="base" hangingPunct="0">
+              <a:spcBef>
+                <a:spcPct val="0"/>
+              </a:spcBef>
+              <a:spcAft>
+                <a:spcPct val="0"/>
+              </a:spcAft>
+              <a:defRPr>
+                <a:solidFill>
+                  <a:schemeClr val="tx1"/>
+                </a:solidFill>
+                <a:latin typeface="Calibri" panose="020F0502020204030204" pitchFamily="34" charset="0"/>
+              </a:defRPr>
+            </a:lvl9pPr>
+          </a:lstStyle>
+          <a:p>
+            <a:pPr algn="ctr" eaLnBrk="1" hangingPunct="1"/>
+            <a:r>
+              <a:rPr lang="en-US" altLang="en-US" sz="1100" dirty="0">
+                <a:latin typeface="Arial" panose="020B0604020202020204" pitchFamily="34" charset="0"/>
+                <a:ea typeface="Amazon Ember" panose="020B0603020204020204" pitchFamily="34" charset="0"/>
+                <a:cs typeface="Arial" panose="020B0604020202020204" pitchFamily="34" charset="0"/>
+              </a:rPr>
+              <a:t>Linux bastion host</a:t>
+            </a:r>
+          </a:p>
+        </p:txBody>
+      </p:sp>
+      <p:pic>
+        <p:nvPicPr>
+          <p:cNvPr id="13" name="Graphic 12">
+            <a:extLst>
+              <a:ext uri="{FF2B5EF4-FFF2-40B4-BE49-F238E27FC236}">
+                <a16:creationId xmlns:a16="http://schemas.microsoft.com/office/drawing/2014/main" id="{794D467E-BDD5-4E69-B7D2-540C1E97B778}"/>
+              </a:ext>
+            </a:extLst>
+          </p:cNvPr>
+          <p:cNvPicPr>
+            <a:picLocks noChangeAspect="1"/>
+          </p:cNvPicPr>
+          <p:nvPr/>
+        </p:nvPicPr>
+        <p:blipFill>
+          <a:blip r:embed="rId12">
+            <a:extLst>
+              <a:ext uri="{96DAC541-7B7A-43D3-8B79-37D633B846F1}">
+                <asvg:svgBlip xmlns:asvg="http://schemas.microsoft.com/office/drawing/2016/SVG/main" r:embed="rId13"/>
+              </a:ext>
+            </a:extLst>
+          </a:blip>
+          <a:stretch>
+            <a:fillRect/>
+          </a:stretch>
+        </p:blipFill>
+        <p:spPr>
+          <a:xfrm>
+            <a:off x="3900032" y="3211611"/>
+            <a:ext cx="381000" cy="381000"/>
+          </a:xfrm>
+          <a:prstGeom prst="rect">
+            <a:avLst/>
+          </a:prstGeom>
+        </p:spPr>
+      </p:pic>
+      <p:sp>
+        <p:nvSpPr>
+          <p:cNvPr id="33" name="TextBox 11">
+            <a:extLst>
+              <a:ext uri="{FF2B5EF4-FFF2-40B4-BE49-F238E27FC236}">
+                <a16:creationId xmlns:a16="http://schemas.microsoft.com/office/drawing/2014/main" id="{01C154D9-74F7-4FB7-A62E-978150220BA7}"/>
+              </a:ext>
+            </a:extLst>
+          </p:cNvPr>
+          <p:cNvSpPr txBox="1">
+            <a:spLocks noChangeArrowheads="1"/>
+          </p:cNvSpPr>
+          <p:nvPr/>
+        </p:nvSpPr>
+        <p:spPr bwMode="auto">
+          <a:xfrm>
+            <a:off x="7093416" y="3040694"/>
+            <a:ext cx="1285574" cy="276999"/>
+          </a:xfrm>
+          <a:prstGeom prst="rect">
+            <a:avLst/>
+          </a:prstGeom>
+          <a:noFill/>
+          <a:ln>
+            <a:noFill/>
+          </a:ln>
+          <a:extLst>
+            <a:ext uri="{909E8E84-426E-40DD-AFC4-6F175D3DCCD1}">
+              <a14:hiddenFill xmlns:a14="http://schemas.microsoft.com/office/drawing/2010/main">
+                <a:solidFill>
+                  <a:srgbClr val="FFFFFF"/>
+                </a:solidFill>
+              </a14:hiddenFill>
+            </a:ext>
+            <a:ext uri="{91240B29-F687-4F45-9708-019B960494DF}">
+              <a14:hiddenLine xmlns:a14="http://schemas.microsoft.com/office/drawing/2010/main" w="9525">
+                <a:solidFill>
+                  <a:srgbClr val="000000"/>
+                </a:solidFill>
+                <a:miter lim="800000"/>
+                <a:headEnd/>
+                <a:tailEnd/>
+              </a14:hiddenLine>
+            </a:ext>
+          </a:extLst>
+        </p:spPr>
+        <p:txBody>
+          <a:bodyPr wrap="square">
+            <a:spAutoFit/>
+          </a:bodyPr>
+          <a:lstStyle>
+            <a:lvl1pPr>
+              <a:defRPr>
+                <a:solidFill>
+                  <a:schemeClr val="tx1"/>
+                </a:solidFill>
+                <a:latin typeface="Calibri" panose="020F0502020204030204" pitchFamily="34" charset="0"/>
+              </a:defRPr>
+            </a:lvl1pPr>
+            <a:lvl2pPr marL="742950" indent="-285750">
+              <a:defRPr>
+                <a:solidFill>
+                  <a:schemeClr val="tx1"/>
+                </a:solidFill>
+                <a:latin typeface="Calibri" panose="020F0502020204030204" pitchFamily="34" charset="0"/>
+              </a:defRPr>
+            </a:lvl2pPr>
+            <a:lvl3pPr marL="1143000" indent="-228600">
+              <a:defRPr>
+                <a:solidFill>
+                  <a:schemeClr val="tx1"/>
+                </a:solidFill>
+                <a:latin typeface="Calibri" panose="020F0502020204030204" pitchFamily="34" charset="0"/>
+              </a:defRPr>
+            </a:lvl3pPr>
+            <a:lvl4pPr marL="1600200" indent="-228600">
+              <a:defRPr>
+                <a:solidFill>
+                  <a:schemeClr val="tx1"/>
+                </a:solidFill>
+                <a:latin typeface="Calibri" panose="020F0502020204030204" pitchFamily="34" charset="0"/>
+              </a:defRPr>
+            </a:lvl4pPr>
+            <a:lvl5pPr marL="2057400" indent="-228600">
+              <a:defRPr>
+                <a:solidFill>
+                  <a:schemeClr val="tx1"/>
+                </a:solidFill>
+                <a:latin typeface="Calibri" panose="020F0502020204030204" pitchFamily="34" charset="0"/>
+              </a:defRPr>
+            </a:lvl5pPr>
+            <a:lvl6pPr marL="2514600" indent="-228600" eaLnBrk="0" fontAlgn="base" hangingPunct="0">
+              <a:spcBef>
+                <a:spcPct val="0"/>
+              </a:spcBef>
+              <a:spcAft>
+                <a:spcPct val="0"/>
+              </a:spcAft>
+              <a:defRPr>
+                <a:solidFill>
+                  <a:schemeClr val="tx1"/>
+                </a:solidFill>
+                <a:latin typeface="Calibri" panose="020F0502020204030204" pitchFamily="34" charset="0"/>
+              </a:defRPr>
+            </a:lvl6pPr>
+            <a:lvl7pPr marL="2971800" indent="-228600" eaLnBrk="0" fontAlgn="base" hangingPunct="0">
+              <a:spcBef>
+                <a:spcPct val="0"/>
+              </a:spcBef>
+              <a:spcAft>
+                <a:spcPct val="0"/>
+              </a:spcAft>
+              <a:defRPr>
+                <a:solidFill>
+                  <a:schemeClr val="tx1"/>
+                </a:solidFill>
+                <a:latin typeface="Calibri" panose="020F0502020204030204" pitchFamily="34" charset="0"/>
+              </a:defRPr>
+            </a:lvl7pPr>
+            <a:lvl8pPr marL="3429000" indent="-228600" eaLnBrk="0" fontAlgn="base" hangingPunct="0">
+              <a:spcBef>
+                <a:spcPct val="0"/>
+              </a:spcBef>
+              <a:spcAft>
+                <a:spcPct val="0"/>
+              </a:spcAft>
+              <a:defRPr>
+                <a:solidFill>
+                  <a:schemeClr val="tx1"/>
+                </a:solidFill>
+                <a:latin typeface="Calibri" panose="020F0502020204030204" pitchFamily="34" charset="0"/>
+              </a:defRPr>
+            </a:lvl8pPr>
+            <a:lvl9pPr marL="3886200" indent="-228600" eaLnBrk="0" fontAlgn="base" hangingPunct="0">
+              <a:spcBef>
+                <a:spcPct val="0"/>
+              </a:spcBef>
+              <a:spcAft>
+                <a:spcPct val="0"/>
+              </a:spcAft>
+              <a:defRPr>
+                <a:solidFill>
+                  <a:schemeClr val="tx1"/>
+                </a:solidFill>
+                <a:latin typeface="Calibri" panose="020F0502020204030204" pitchFamily="34" charset="0"/>
+              </a:defRPr>
+            </a:lvl9pPr>
+          </a:lstStyle>
+          <a:p>
+            <a:pPr algn="ctr"/>
+            <a:r>
+              <a:rPr lang="en-US" altLang="en-US" sz="1200" dirty="0">
+                <a:latin typeface="Arial" panose="020B0604020202020204" pitchFamily="34" charset="0"/>
+                <a:ea typeface="Amazon Ember" panose="020B0603020204020204" pitchFamily="34" charset="0"/>
+                <a:cs typeface="Arial" panose="020B0604020202020204" pitchFamily="34" charset="0"/>
+              </a:rPr>
+              <a:t>CloudWatch</a:t>
+            </a:r>
+          </a:p>
+        </p:txBody>
+      </p:sp>
+      <p:pic>
+        <p:nvPicPr>
+          <p:cNvPr id="32" name="Graphic 60">
+            <a:extLst>
+              <a:ext uri="{FF2B5EF4-FFF2-40B4-BE49-F238E27FC236}">
+                <a16:creationId xmlns:a16="http://schemas.microsoft.com/office/drawing/2014/main" id="{DF86A74A-71C9-4EA9-896A-7C288CAA71EF}"/>
+              </a:ext>
+            </a:extLst>
+          </p:cNvPr>
+          <p:cNvPicPr>
+            <a:picLocks noChangeAspect="1" noChangeArrowheads="1"/>
+          </p:cNvPicPr>
+          <p:nvPr/>
+        </p:nvPicPr>
+        <p:blipFill>
+          <a:blip r:embed="rId14">
+            <a:extLst>
+              <a:ext uri="{28A0092B-C50C-407E-A947-70E740481C1C}">
+                <a14:useLocalDpi xmlns:a14="http://schemas.microsoft.com/office/drawing/2010/main" val="0"/>
+              </a:ext>
+            </a:extLst>
+          </a:blip>
+          <a:srcRect/>
+          <a:stretch>
+            <a:fillRect/>
+          </a:stretch>
+        </p:blipFill>
+        <p:spPr bwMode="auto">
+          <a:xfrm>
+            <a:off x="2109256" y="3388064"/>
+            <a:ext cx="457200" cy="457200"/>
+          </a:xfrm>
+          <a:prstGeom prst="rect">
+            <a:avLst/>
+          </a:prstGeom>
+          <a:noFill/>
+          <a:ln>
+            <a:noFill/>
+          </a:ln>
+          <a:extLst>
+            <a:ext uri="{909E8E84-426E-40DD-AFC4-6F175D3DCCD1}">
+              <a14:hiddenFill xmlns:a14="http://schemas.microsoft.com/office/drawing/2010/main">
+                <a:solidFill>
+                  <a:srgbClr val="FFFFFF"/>
+                </a:solidFill>
+              </a14:hiddenFill>
+            </a:ext>
+            <a:ext uri="{91240B29-F687-4F45-9708-019B960494DF}">
+              <a14:hiddenLine xmlns:a14="http://schemas.microsoft.com/office/drawing/2010/main" w="9525">
+                <a:solidFill>
+                  <a:srgbClr val="000000"/>
+                </a:solidFill>
+                <a:miter lim="800000"/>
+                <a:headEnd/>
+                <a:tailEnd/>
+              </a14:hiddenLine>
+            </a:ext>
+          </a:extLst>
+        </p:spPr>
+      </p:pic>
+      <p:pic>
+        <p:nvPicPr>
+          <p:cNvPr id="35" name="Graphic 60">
+            <a:extLst>
+              <a:ext uri="{FF2B5EF4-FFF2-40B4-BE49-F238E27FC236}">
+                <a16:creationId xmlns:a16="http://schemas.microsoft.com/office/drawing/2014/main" id="{B2D044DF-F87B-49A2-B710-9E8ECA5B1A98}"/>
+              </a:ext>
+            </a:extLst>
+          </p:cNvPr>
+          <p:cNvPicPr>
+            <a:picLocks noChangeAspect="1" noChangeArrowheads="1"/>
+          </p:cNvPicPr>
+          <p:nvPr/>
+        </p:nvPicPr>
+        <p:blipFill>
+          <a:blip r:embed="rId15">
+            <a:alphaModFix amt="50000"/>
+            <a:extLst>
+              <a:ext uri="{BEBA8EAE-BF5A-486C-A8C5-ECC9F3942E4B}">
+                <a14:imgProps xmlns:a14="http://schemas.microsoft.com/office/drawing/2010/main">
+                  <a14:imgLayer r:embed="rId16">
+                    <a14:imgEffect>
+                      <a14:artisticBlur/>
+                    </a14:imgEffect>
+                  </a14:imgLayer>
+                </a14:imgProps>
+              </a:ext>
+              <a:ext uri="{28A0092B-C50C-407E-A947-70E740481C1C}">
+                <a14:useLocalDpi xmlns:a14="http://schemas.microsoft.com/office/drawing/2010/main" val="0"/>
+              </a:ext>
+            </a:extLst>
+          </a:blip>
+          <a:srcRect/>
+          <a:stretch>
+            <a:fillRect/>
+          </a:stretch>
+        </p:blipFill>
+        <p:spPr bwMode="auto">
+          <a:xfrm>
+            <a:off x="5608164" y="3395829"/>
+            <a:ext cx="457200" cy="457200"/>
+          </a:xfrm>
+          <a:prstGeom prst="rect">
+            <a:avLst/>
+          </a:prstGeom>
+          <a:noFill/>
+          <a:ln>
+            <a:noFill/>
+          </a:ln>
+          <a:extLst>
+            <a:ext uri="{909E8E84-426E-40DD-AFC4-6F175D3DCCD1}">
+              <a14:hiddenFill xmlns:a14="http://schemas.microsoft.com/office/drawing/2010/main">
+                <a:solidFill>
+                  <a:srgbClr val="FFFFFF"/>
+                </a:solidFill>
+              </a14:hiddenFill>
+            </a:ext>
+            <a:ext uri="{91240B29-F687-4F45-9708-019B960494DF}">
+              <a14:hiddenLine xmlns:a14="http://schemas.microsoft.com/office/drawing/2010/main" w="9525">
+                <a:solidFill>
+                  <a:srgbClr val="000000"/>
+                </a:solidFill>
+                <a:miter lim="800000"/>
+                <a:headEnd/>
+                <a:tailEnd/>
+              </a14:hiddenLine>
+            </a:ext>
+          </a:extLst>
+        </p:spPr>
+      </p:pic>
+      <p:sp>
+        <p:nvSpPr>
+          <p:cNvPr id="36" name="TextBox 9">
+            <a:extLst>
+              <a:ext uri="{FF2B5EF4-FFF2-40B4-BE49-F238E27FC236}">
+                <a16:creationId xmlns:a16="http://schemas.microsoft.com/office/drawing/2014/main" id="{F603C76B-0C0A-470C-917A-2B291C84B38E}"/>
+              </a:ext>
+            </a:extLst>
+          </p:cNvPr>
+          <p:cNvSpPr txBox="1">
+            <a:spLocks noChangeArrowheads="1"/>
+          </p:cNvSpPr>
+          <p:nvPr/>
+        </p:nvSpPr>
+        <p:spPr bwMode="auto">
+          <a:xfrm>
+            <a:off x="7093416" y="4338053"/>
+            <a:ext cx="1285574" cy="276999"/>
+          </a:xfrm>
+          <a:prstGeom prst="rect">
+            <a:avLst/>
+          </a:prstGeom>
+          <a:noFill/>
+          <a:ln>
+            <a:noFill/>
+          </a:ln>
+          <a:extLst>
+            <a:ext uri="{909E8E84-426E-40DD-AFC4-6F175D3DCCD1}">
+              <a14:hiddenFill xmlns:a14="http://schemas.microsoft.com/office/drawing/2010/main">
+                <a:solidFill>
+                  <a:srgbClr val="FFFFFF"/>
+                </a:solidFill>
+              </a14:hiddenFill>
+            </a:ext>
+            <a:ext uri="{91240B29-F687-4F45-9708-019B960494DF}">
+              <a14:hiddenLine xmlns:a14="http://schemas.microsoft.com/office/drawing/2010/main" w="9525">
+                <a:solidFill>
+                  <a:srgbClr val="000000"/>
+                </a:solidFill>
+                <a:miter lim="800000"/>
+                <a:headEnd/>
+                <a:tailEnd/>
+              </a14:hiddenLine>
+            </a:ext>
+          </a:extLst>
+        </p:spPr>
+        <p:txBody>
+          <a:bodyPr wrap="square" lIns="0" rIns="0">
+            <a:spAutoFit/>
+          </a:bodyPr>
+          <a:lstStyle>
+            <a:lvl1pPr>
+              <a:defRPr>
+                <a:solidFill>
+                  <a:schemeClr val="tx1"/>
+                </a:solidFill>
+                <a:latin typeface="Calibri" panose="020F0502020204030204" pitchFamily="34" charset="0"/>
+              </a:defRPr>
+            </a:lvl1pPr>
+            <a:lvl2pPr marL="742950" indent="-285750">
+              <a:defRPr>
+                <a:solidFill>
+                  <a:schemeClr val="tx1"/>
+                </a:solidFill>
+                <a:latin typeface="Calibri" panose="020F0502020204030204" pitchFamily="34" charset="0"/>
+              </a:defRPr>
+            </a:lvl2pPr>
+            <a:lvl3pPr marL="1143000" indent="-228600">
+              <a:defRPr>
+                <a:solidFill>
+                  <a:schemeClr val="tx1"/>
+                </a:solidFill>
+                <a:latin typeface="Calibri" panose="020F0502020204030204" pitchFamily="34" charset="0"/>
+              </a:defRPr>
+            </a:lvl3pPr>
+            <a:lvl4pPr marL="1600200" indent="-228600">
+              <a:defRPr>
+                <a:solidFill>
+                  <a:schemeClr val="tx1"/>
+                </a:solidFill>
+                <a:latin typeface="Calibri" panose="020F0502020204030204" pitchFamily="34" charset="0"/>
+              </a:defRPr>
+            </a:lvl4pPr>
+            <a:lvl5pPr marL="2057400" indent="-228600">
+              <a:defRPr>
+                <a:solidFill>
+                  <a:schemeClr val="tx1"/>
+                </a:solidFill>
+                <a:latin typeface="Calibri" panose="020F0502020204030204" pitchFamily="34" charset="0"/>
+              </a:defRPr>
+            </a:lvl5pPr>
+            <a:lvl6pPr marL="2514600" indent="-228600" eaLnBrk="0" fontAlgn="base" hangingPunct="0">
+              <a:spcBef>
+                <a:spcPct val="0"/>
+              </a:spcBef>
+              <a:spcAft>
+                <a:spcPct val="0"/>
+              </a:spcAft>
+              <a:defRPr>
+                <a:solidFill>
+                  <a:schemeClr val="tx1"/>
+                </a:solidFill>
+                <a:latin typeface="Calibri" panose="020F0502020204030204" pitchFamily="34" charset="0"/>
+              </a:defRPr>
+            </a:lvl6pPr>
+            <a:lvl7pPr marL="2971800" indent="-228600" eaLnBrk="0" fontAlgn="base" hangingPunct="0">
+              <a:spcBef>
+                <a:spcPct val="0"/>
+              </a:spcBef>
+              <a:spcAft>
+                <a:spcPct val="0"/>
+              </a:spcAft>
+              <a:defRPr>
+                <a:solidFill>
+                  <a:schemeClr val="tx1"/>
+                </a:solidFill>
+                <a:latin typeface="Calibri" panose="020F0502020204030204" pitchFamily="34" charset="0"/>
+              </a:defRPr>
+            </a:lvl7pPr>
+            <a:lvl8pPr marL="3429000" indent="-228600" eaLnBrk="0" fontAlgn="base" hangingPunct="0">
+              <a:spcBef>
+                <a:spcPct val="0"/>
+              </a:spcBef>
+              <a:spcAft>
+                <a:spcPct val="0"/>
+              </a:spcAft>
+              <a:defRPr>
+                <a:solidFill>
+                  <a:schemeClr val="tx1"/>
+                </a:solidFill>
+                <a:latin typeface="Calibri" panose="020F0502020204030204" pitchFamily="34" charset="0"/>
+              </a:defRPr>
+            </a:lvl8pPr>
+            <a:lvl9pPr marL="3886200" indent="-228600" eaLnBrk="0" fontAlgn="base" hangingPunct="0">
+              <a:spcBef>
+                <a:spcPct val="0"/>
+              </a:spcBef>
+              <a:spcAft>
+                <a:spcPct val="0"/>
+              </a:spcAft>
+              <a:defRPr>
+                <a:solidFill>
+                  <a:schemeClr val="tx1"/>
+                </a:solidFill>
+                <a:latin typeface="Calibri" panose="020F0502020204030204" pitchFamily="34" charset="0"/>
+              </a:defRPr>
+            </a:lvl9pPr>
+          </a:lstStyle>
+          <a:p>
+            <a:pPr algn="ctr" eaLnBrk="1" hangingPunct="1"/>
+            <a:r>
+              <a:rPr lang="en-US" altLang="en-US" sz="1200" dirty="0">
+                <a:latin typeface="Arial" panose="020B0604020202020204" pitchFamily="34" charset="0"/>
+                <a:ea typeface="Amazon Ember" panose="020B0603020204020204" pitchFamily="34" charset="0"/>
+                <a:cs typeface="Arial" panose="020B0604020202020204" pitchFamily="34" charset="0"/>
+              </a:rPr>
+              <a:t>Systems Manager</a:t>
+            </a:r>
+          </a:p>
+        </p:txBody>
+      </p:sp>
+      <p:pic>
+        <p:nvPicPr>
+          <p:cNvPr id="37" name="Graphic 15">
+            <a:extLst>
+              <a:ext uri="{FF2B5EF4-FFF2-40B4-BE49-F238E27FC236}">
+                <a16:creationId xmlns:a16="http://schemas.microsoft.com/office/drawing/2014/main" id="{EC9C6A2F-D7C6-4685-9600-E83BABD1E579}"/>
+              </a:ext>
+            </a:extLst>
+          </p:cNvPr>
+          <p:cNvPicPr>
+            <a:picLocks noChangeAspect="1" noChangeArrowheads="1"/>
+          </p:cNvPicPr>
+          <p:nvPr/>
+        </p:nvPicPr>
+        <p:blipFill>
+          <a:blip r:embed="rId17">
+            <a:extLst>
+              <a:ext uri="{28A0092B-C50C-407E-A947-70E740481C1C}">
+                <a14:useLocalDpi xmlns:a14="http://schemas.microsoft.com/office/drawing/2010/main" val="0"/>
+              </a:ext>
+            </a:extLst>
+          </a:blip>
+          <a:srcRect/>
+          <a:stretch>
+            <a:fillRect/>
+          </a:stretch>
+        </p:blipFill>
+        <p:spPr bwMode="auto">
+          <a:xfrm>
+            <a:off x="7355203" y="3576053"/>
+            <a:ext cx="762000" cy="762000"/>
+          </a:xfrm>
+          <a:prstGeom prst="rect">
+            <a:avLst/>
+          </a:prstGeom>
+          <a:noFill/>
+          <a:ln>
+            <a:noFill/>
+          </a:ln>
+          <a:extLst>
+            <a:ext uri="{909E8E84-426E-40DD-AFC4-6F175D3DCCD1}">
+              <a14:hiddenFill xmlns:a14="http://schemas.microsoft.com/office/drawing/2010/main">
+                <a:solidFill>
+                  <a:srgbClr val="FFFFFF"/>
+                </a:solidFill>
+              </a14:hiddenFill>
+            </a:ext>
+            <a:ext uri="{91240B29-F687-4F45-9708-019B960494DF}">
+              <a14:hiddenLine xmlns:a14="http://schemas.microsoft.com/office/drawing/2010/main" w="9525">
+                <a:solidFill>
+                  <a:srgbClr val="000000"/>
+                </a:solidFill>
+                <a:miter lim="800000"/>
+                <a:headEnd/>
+                <a:tailEnd/>
+              </a14:hiddenLine>
+            </a:ext>
+          </a:extLst>
+        </p:spPr>
+      </p:pic>
+      <p:sp>
+        <p:nvSpPr>
+          <p:cNvPr id="31" name="Rectangle 30">
+            <a:extLst>
+              <a:ext uri="{FF2B5EF4-FFF2-40B4-BE49-F238E27FC236}">
+                <a16:creationId xmlns:a16="http://schemas.microsoft.com/office/drawing/2014/main" id="{DE1BB066-A929-4D79-92DC-B688675FA155}"/>
+              </a:ext>
+            </a:extLst>
+          </p:cNvPr>
+          <p:cNvSpPr/>
+          <p:nvPr/>
+        </p:nvSpPr>
+        <p:spPr>
+          <a:xfrm>
+            <a:off x="4794785" y="1088315"/>
+            <a:ext cx="2083959" cy="4662781"/>
+          </a:xfrm>
+          <a:prstGeom prst="rect">
+            <a:avLst/>
+          </a:prstGeom>
+          <a:noFill/>
+          <a:ln w="12700">
             <a:solidFill>
-              <a:srgbClr val="1D8900">
-                <a:alpha val="9804"/>
-              </a:srgbClr>
+              <a:srgbClr val="5B9CD5"/>
             </a:solidFill>
-            <a:ln w="12700">
-              <a:noFill/>
-              <a:prstDash val="dash"/>
-            </a:ln>
-          </p:spPr>
-          <p:style>
-            <a:lnRef idx="2">
-              <a:schemeClr val="accent1">
-                <a:shade val="50000"/>
-              </a:schemeClr>
-            </a:lnRef>
-            <a:fillRef idx="1">
-              <a:schemeClr val="accent1"/>
-            </a:fillRef>
-            <a:effectRef idx="0">
-              <a:schemeClr val="accent1"/>
-            </a:effectRef>
-            <a:fontRef idx="minor">
-              <a:schemeClr val="lt1"/>
-            </a:fontRef>
-          </p:style>
-          <p:txBody>
-            <a:bodyPr lIns="502920"/>
-            <a:lstStyle/>
-            <a:p>
-              <a:pPr eaLnBrk="1" fontAlgn="auto" hangingPunct="1">
-                <a:spcBef>
-                  <a:spcPts val="0"/>
-                </a:spcBef>
-                <a:spcAft>
-                  <a:spcPts val="0"/>
-                </a:spcAft>
-                <a:defRPr/>
-              </a:pPr>
-              <a:r>
-                <a:rPr lang="en-US" sz="1200" dirty="0">
-                  <a:solidFill>
-                    <a:srgbClr val="1E8900"/>
-                  </a:solidFill>
-                  <a:latin typeface="Arial" panose="020B0604020202020204" pitchFamily="34" charset="0"/>
-                  <a:cs typeface="Arial" panose="020B0604020202020204" pitchFamily="34" charset="0"/>
-                </a:rPr>
-                <a:t>Public subnet</a:t>
-              </a:r>
-            </a:p>
-          </p:txBody>
-        </p:sp>
-        <p:pic>
-          <p:nvPicPr>
-            <p:cNvPr id="15" name="Graphic 14">
-              <a:extLst>
-                <a:ext uri="{FF2B5EF4-FFF2-40B4-BE49-F238E27FC236}">
-                  <a16:creationId xmlns:a16="http://schemas.microsoft.com/office/drawing/2014/main" id="{7B498B08-B788-4613-8E73-49F47FD39E27}"/>
-                </a:ext>
-              </a:extLst>
-            </p:cNvPr>
-            <p:cNvPicPr>
-              <a:picLocks noChangeAspect="1"/>
-            </p:cNvPicPr>
-            <p:nvPr/>
-          </p:nvPicPr>
-          <p:blipFill>
-            <a:blip r:embed="rId7">
-              <a:extLst>
-                <a:ext uri="{96DAC541-7B7A-43D3-8B79-37D633B846F1}">
-                  <asvg:svgBlip xmlns:asvg="http://schemas.microsoft.com/office/drawing/2016/SVG/main" r:embed="rId8"/>
-                </a:ext>
-              </a:extLst>
-            </a:blip>
-            <a:stretch>
-              <a:fillRect/>
-            </a:stretch>
-          </p:blipFill>
-          <p:spPr>
-            <a:xfrm>
-              <a:off x="1444979" y="1850314"/>
-              <a:ext cx="381000" cy="381000"/>
-            </a:xfrm>
-            <a:prstGeom prst="rect">
-              <a:avLst/>
-            </a:prstGeom>
-          </p:spPr>
-        </p:pic>
-        <p:sp>
-          <p:nvSpPr>
-            <p:cNvPr id="16" name="Rectangle 15">
-              <a:extLst>
-                <a:ext uri="{FF2B5EF4-FFF2-40B4-BE49-F238E27FC236}">
-                  <a16:creationId xmlns:a16="http://schemas.microsoft.com/office/drawing/2014/main" id="{A38A1231-6F42-4400-A7EB-D1642D6C3884}"/>
-                </a:ext>
-              </a:extLst>
-            </p:cNvPr>
-            <p:cNvSpPr/>
-            <p:nvPr/>
-          </p:nvSpPr>
-          <p:spPr>
-            <a:xfrm>
-              <a:off x="1444979" y="3769555"/>
-              <a:ext cx="2614718" cy="937496"/>
-            </a:xfrm>
-            <a:prstGeom prst="rect">
-              <a:avLst/>
-            </a:prstGeom>
+            <a:prstDash val="dash"/>
+          </a:ln>
+        </p:spPr>
+        <p:style>
+          <a:lnRef idx="2">
+            <a:schemeClr val="accent1">
+              <a:shade val="50000"/>
+            </a:schemeClr>
+          </a:lnRef>
+          <a:fillRef idx="1">
+            <a:schemeClr val="accent1"/>
+          </a:fillRef>
+          <a:effectRef idx="0">
+            <a:schemeClr val="accent1"/>
+          </a:effectRef>
+          <a:fontRef idx="minor">
+            <a:schemeClr val="lt1"/>
+          </a:fontRef>
+        </p:style>
+        <p:txBody>
+          <a:bodyPr tIns="91440"/>
+          <a:lstStyle/>
+          <a:p>
+            <a:pPr algn="ctr" eaLnBrk="1" fontAlgn="auto" hangingPunct="1">
+              <a:spcBef>
+                <a:spcPts val="0"/>
+              </a:spcBef>
+              <a:spcAft>
+                <a:spcPts val="0"/>
+              </a:spcAft>
+              <a:defRPr/>
+            </a:pPr>
+            <a:r>
+              <a:rPr lang="en-US" sz="1200" dirty="0">
+                <a:solidFill>
+                  <a:srgbClr val="5B9CD5"/>
+                </a:solidFill>
+                <a:latin typeface="Arial" panose="020B0604020202020204" pitchFamily="34" charset="0"/>
+                <a:cs typeface="Arial" panose="020B0604020202020204" pitchFamily="34" charset="0"/>
+              </a:rPr>
+              <a:t>Availability Zone 2</a:t>
+            </a:r>
+          </a:p>
+        </p:txBody>
+      </p:sp>
+      <p:pic>
+        <p:nvPicPr>
+          <p:cNvPr id="38" name="Graphic 37">
+            <a:extLst>
+              <a:ext uri="{FF2B5EF4-FFF2-40B4-BE49-F238E27FC236}">
+                <a16:creationId xmlns:a16="http://schemas.microsoft.com/office/drawing/2014/main" id="{A94B1B30-1F8E-4DA6-B324-E0580B69D706}"/>
+              </a:ext>
+            </a:extLst>
+          </p:cNvPr>
+          <p:cNvPicPr>
+            <a:picLocks noChangeAspect="1"/>
+          </p:cNvPicPr>
+          <p:nvPr/>
+        </p:nvPicPr>
+        <p:blipFill>
+          <a:blip r:embed="rId7">
+            <a:extLst>
+              <a:ext uri="{96DAC541-7B7A-43D3-8B79-37D633B846F1}">
+                <asvg:svgBlip xmlns:asvg="http://schemas.microsoft.com/office/drawing/2016/SVG/main" r:embed="rId8"/>
+              </a:ext>
+            </a:extLst>
+          </a:blip>
+          <a:stretch>
+            <a:fillRect/>
+          </a:stretch>
+        </p:blipFill>
+        <p:spPr>
+          <a:xfrm>
+            <a:off x="4950171" y="1850315"/>
+            <a:ext cx="381000" cy="381000"/>
+          </a:xfrm>
+          <a:prstGeom prst="rect">
+            <a:avLst/>
+          </a:prstGeom>
+        </p:spPr>
+      </p:pic>
+      <p:sp>
+        <p:nvSpPr>
+          <p:cNvPr id="39" name="Rectangle 38">
+            <a:extLst>
+              <a:ext uri="{FF2B5EF4-FFF2-40B4-BE49-F238E27FC236}">
+                <a16:creationId xmlns:a16="http://schemas.microsoft.com/office/drawing/2014/main" id="{0577F834-6774-460E-B983-EBF77B1EA439}"/>
+              </a:ext>
+            </a:extLst>
+          </p:cNvPr>
+          <p:cNvSpPr/>
+          <p:nvPr/>
+        </p:nvSpPr>
+        <p:spPr>
+          <a:xfrm>
+            <a:off x="4933065" y="4515509"/>
+            <a:ext cx="1807398" cy="937496"/>
+          </a:xfrm>
+          <a:prstGeom prst="rect">
+            <a:avLst/>
+          </a:prstGeom>
+          <a:solidFill>
+            <a:srgbClr val="007CBC">
+              <a:alpha val="9804"/>
+            </a:srgbClr>
+          </a:solidFill>
+          <a:ln w="12700">
+            <a:noFill/>
+            <a:prstDash val="dash"/>
+          </a:ln>
+        </p:spPr>
+        <p:style>
+          <a:lnRef idx="2">
+            <a:schemeClr val="accent1">
+              <a:shade val="50000"/>
+            </a:schemeClr>
+          </a:lnRef>
+          <a:fillRef idx="1">
+            <a:schemeClr val="accent1"/>
+          </a:fillRef>
+          <a:effectRef idx="0">
+            <a:schemeClr val="accent1"/>
+          </a:effectRef>
+          <a:fontRef idx="minor">
+            <a:schemeClr val="lt1"/>
+          </a:fontRef>
+        </p:style>
+        <p:txBody>
+          <a:bodyPr lIns="502920"/>
+          <a:lstStyle/>
+          <a:p>
+            <a:pPr eaLnBrk="1" fontAlgn="auto" hangingPunct="1">
+              <a:spcBef>
+                <a:spcPts val="0"/>
+              </a:spcBef>
+              <a:spcAft>
+                <a:spcPts val="0"/>
+              </a:spcAft>
+              <a:defRPr/>
+            </a:pPr>
+            <a:r>
+              <a:rPr lang="en-US" sz="1200" dirty="0">
+                <a:solidFill>
+                  <a:srgbClr val="5B9CD5"/>
+                </a:solidFill>
+                <a:latin typeface="Arial" panose="020B0604020202020204" pitchFamily="34" charset="0"/>
+                <a:cs typeface="Arial" panose="020B0604020202020204" pitchFamily="34" charset="0"/>
+              </a:rPr>
+              <a:t>Private subnet</a:t>
+            </a:r>
+          </a:p>
+        </p:txBody>
+      </p:sp>
+      <p:pic>
+        <p:nvPicPr>
+          <p:cNvPr id="40" name="Graphic 39">
+            <a:extLst>
+              <a:ext uri="{FF2B5EF4-FFF2-40B4-BE49-F238E27FC236}">
+                <a16:creationId xmlns:a16="http://schemas.microsoft.com/office/drawing/2014/main" id="{02334358-9DBE-4EE5-9FB0-15D82B63A1DF}"/>
+              </a:ext>
+            </a:extLst>
+          </p:cNvPr>
+          <p:cNvPicPr>
+            <a:picLocks noChangeAspect="1"/>
+          </p:cNvPicPr>
+          <p:nvPr/>
+        </p:nvPicPr>
+        <p:blipFill>
+          <a:blip r:embed="rId9">
+            <a:extLst>
+              <a:ext uri="{96DAC541-7B7A-43D3-8B79-37D633B846F1}">
+                <asvg:svgBlip xmlns:asvg="http://schemas.microsoft.com/office/drawing/2016/SVG/main" r:embed="rId10"/>
+              </a:ext>
+            </a:extLst>
+          </a:blip>
+          <a:stretch>
+            <a:fillRect/>
+          </a:stretch>
+        </p:blipFill>
+        <p:spPr>
+          <a:xfrm>
+            <a:off x="4950170" y="4515509"/>
+            <a:ext cx="381000" cy="381000"/>
+          </a:xfrm>
+          <a:prstGeom prst="rect">
+            <a:avLst/>
+          </a:prstGeom>
+        </p:spPr>
+      </p:pic>
+      <p:sp>
+        <p:nvSpPr>
+          <p:cNvPr id="41" name="TextBox 17">
+            <a:extLst>
+              <a:ext uri="{FF2B5EF4-FFF2-40B4-BE49-F238E27FC236}">
+                <a16:creationId xmlns:a16="http://schemas.microsoft.com/office/drawing/2014/main" id="{F676D7BD-02F8-47C1-95A4-4FD64ED1A8C6}"/>
+              </a:ext>
+            </a:extLst>
+          </p:cNvPr>
+          <p:cNvSpPr txBox="1">
+            <a:spLocks noChangeArrowheads="1"/>
+          </p:cNvSpPr>
+          <p:nvPr/>
+        </p:nvSpPr>
+        <p:spPr bwMode="auto">
+          <a:xfrm>
+            <a:off x="5219381" y="2803299"/>
+            <a:ext cx="1234766" cy="261610"/>
+          </a:xfrm>
+          <a:prstGeom prst="rect">
+            <a:avLst/>
+          </a:prstGeom>
+          <a:noFill/>
+          <a:ln>
+            <a:noFill/>
+          </a:ln>
+          <a:extLst>
+            <a:ext uri="{909E8E84-426E-40DD-AFC4-6F175D3DCCD1}">
+              <a14:hiddenFill xmlns:a14="http://schemas.microsoft.com/office/drawing/2010/main">
+                <a:solidFill>
+                  <a:srgbClr val="FFFFFF"/>
+                </a:solidFill>
+              </a14:hiddenFill>
+            </a:ext>
+            <a:ext uri="{91240B29-F687-4F45-9708-019B960494DF}">
+              <a14:hiddenLine xmlns:a14="http://schemas.microsoft.com/office/drawing/2010/main" w="9525">
+                <a:solidFill>
+                  <a:srgbClr val="000000"/>
+                </a:solidFill>
+                <a:miter lim="800000"/>
+                <a:headEnd/>
+                <a:tailEnd/>
+              </a14:hiddenLine>
+            </a:ext>
+          </a:extLst>
+        </p:spPr>
+        <p:txBody>
+          <a:bodyPr wrap="square">
+            <a:spAutoFit/>
+          </a:bodyPr>
+          <a:lstStyle>
+            <a:lvl1pPr>
+              <a:defRPr>
+                <a:solidFill>
+                  <a:schemeClr val="tx1"/>
+                </a:solidFill>
+                <a:latin typeface="Calibri" panose="020F0502020204030204" pitchFamily="34" charset="0"/>
+              </a:defRPr>
+            </a:lvl1pPr>
+            <a:lvl2pPr marL="742950" indent="-285750">
+              <a:defRPr>
+                <a:solidFill>
+                  <a:schemeClr val="tx1"/>
+                </a:solidFill>
+                <a:latin typeface="Calibri" panose="020F0502020204030204" pitchFamily="34" charset="0"/>
+              </a:defRPr>
+            </a:lvl2pPr>
+            <a:lvl3pPr marL="1143000" indent="-228600">
+              <a:defRPr>
+                <a:solidFill>
+                  <a:schemeClr val="tx1"/>
+                </a:solidFill>
+                <a:latin typeface="Calibri" panose="020F0502020204030204" pitchFamily="34" charset="0"/>
+              </a:defRPr>
+            </a:lvl3pPr>
+            <a:lvl4pPr marL="1600200" indent="-228600">
+              <a:defRPr>
+                <a:solidFill>
+                  <a:schemeClr val="tx1"/>
+                </a:solidFill>
+                <a:latin typeface="Calibri" panose="020F0502020204030204" pitchFamily="34" charset="0"/>
+              </a:defRPr>
+            </a:lvl4pPr>
+            <a:lvl5pPr marL="2057400" indent="-228600">
+              <a:defRPr>
+                <a:solidFill>
+                  <a:schemeClr val="tx1"/>
+                </a:solidFill>
+                <a:latin typeface="Calibri" panose="020F0502020204030204" pitchFamily="34" charset="0"/>
+              </a:defRPr>
+            </a:lvl5pPr>
+            <a:lvl6pPr marL="2514600" indent="-228600" eaLnBrk="0" fontAlgn="base" hangingPunct="0">
+              <a:spcBef>
+                <a:spcPct val="0"/>
+              </a:spcBef>
+              <a:spcAft>
+                <a:spcPct val="0"/>
+              </a:spcAft>
+              <a:defRPr>
+                <a:solidFill>
+                  <a:schemeClr val="tx1"/>
+                </a:solidFill>
+                <a:latin typeface="Calibri" panose="020F0502020204030204" pitchFamily="34" charset="0"/>
+              </a:defRPr>
+            </a:lvl6pPr>
+            <a:lvl7pPr marL="2971800" indent="-228600" eaLnBrk="0" fontAlgn="base" hangingPunct="0">
+              <a:spcBef>
+                <a:spcPct val="0"/>
+              </a:spcBef>
+              <a:spcAft>
+                <a:spcPct val="0"/>
+              </a:spcAft>
+              <a:defRPr>
+                <a:solidFill>
+                  <a:schemeClr val="tx1"/>
+                </a:solidFill>
+                <a:latin typeface="Calibri" panose="020F0502020204030204" pitchFamily="34" charset="0"/>
+              </a:defRPr>
+            </a:lvl7pPr>
+            <a:lvl8pPr marL="3429000" indent="-228600" eaLnBrk="0" fontAlgn="base" hangingPunct="0">
+              <a:spcBef>
+                <a:spcPct val="0"/>
+              </a:spcBef>
+              <a:spcAft>
+                <a:spcPct val="0"/>
+              </a:spcAft>
+              <a:defRPr>
+                <a:solidFill>
+                  <a:schemeClr val="tx1"/>
+                </a:solidFill>
+                <a:latin typeface="Calibri" panose="020F0502020204030204" pitchFamily="34" charset="0"/>
+              </a:defRPr>
+            </a:lvl8pPr>
+            <a:lvl9pPr marL="3886200" indent="-228600" eaLnBrk="0" fontAlgn="base" hangingPunct="0">
+              <a:spcBef>
+                <a:spcPct val="0"/>
+              </a:spcBef>
+              <a:spcAft>
+                <a:spcPct val="0"/>
+              </a:spcAft>
+              <a:defRPr>
+                <a:solidFill>
+                  <a:schemeClr val="tx1"/>
+                </a:solidFill>
+                <a:latin typeface="Calibri" panose="020F0502020204030204" pitchFamily="34" charset="0"/>
+              </a:defRPr>
+            </a:lvl9pPr>
+          </a:lstStyle>
+          <a:p>
+            <a:pPr algn="ctr" eaLnBrk="1" hangingPunct="1"/>
+            <a:r>
+              <a:rPr lang="en-US" altLang="en-US" sz="1100" dirty="0">
+                <a:latin typeface="Arial" panose="020B0604020202020204" pitchFamily="34" charset="0"/>
+                <a:ea typeface="Amazon Ember" panose="020B0603020204020204" pitchFamily="34" charset="0"/>
+                <a:cs typeface="Arial" panose="020B0604020202020204" pitchFamily="34" charset="0"/>
+              </a:rPr>
+              <a:t>NAT gateway</a:t>
+            </a:r>
+          </a:p>
+        </p:txBody>
+      </p:sp>
+      <p:pic>
+        <p:nvPicPr>
+          <p:cNvPr id="42" name="Graphic 35">
+            <a:extLst>
+              <a:ext uri="{FF2B5EF4-FFF2-40B4-BE49-F238E27FC236}">
+                <a16:creationId xmlns:a16="http://schemas.microsoft.com/office/drawing/2014/main" id="{1104155D-E9EC-4AD6-BA0E-C1E78F2F29E4}"/>
+              </a:ext>
+            </a:extLst>
+          </p:cNvPr>
+          <p:cNvPicPr>
+            <a:picLocks noChangeAspect="1" noChangeArrowheads="1"/>
+          </p:cNvPicPr>
+          <p:nvPr/>
+        </p:nvPicPr>
+        <p:blipFill>
+          <a:blip r:embed="rId11">
+            <a:extLst>
+              <a:ext uri="{28A0092B-C50C-407E-A947-70E740481C1C}">
+                <a14:useLocalDpi xmlns:a14="http://schemas.microsoft.com/office/drawing/2010/main" val="0"/>
+              </a:ext>
+            </a:extLst>
+          </a:blip>
+          <a:srcRect/>
+          <a:stretch>
+            <a:fillRect/>
+          </a:stretch>
+        </p:blipFill>
+        <p:spPr bwMode="auto">
+          <a:xfrm>
+            <a:off x="5608164" y="2358448"/>
+            <a:ext cx="457200" cy="457200"/>
+          </a:xfrm>
+          <a:prstGeom prst="rect">
+            <a:avLst/>
+          </a:prstGeom>
+          <a:noFill/>
+          <a:ln>
+            <a:noFill/>
+          </a:ln>
+          <a:extLst>
+            <a:ext uri="{909E8E84-426E-40DD-AFC4-6F175D3DCCD1}">
+              <a14:hiddenFill xmlns:a14="http://schemas.microsoft.com/office/drawing/2010/main">
+                <a:solidFill>
+                  <a:srgbClr val="FFFFFF"/>
+                </a:solidFill>
+              </a14:hiddenFill>
+            </a:ext>
+            <a:ext uri="{91240B29-F687-4F45-9708-019B960494DF}">
+              <a14:hiddenLine xmlns:a14="http://schemas.microsoft.com/office/drawing/2010/main" w="9525">
+                <a:solidFill>
+                  <a:srgbClr val="000000"/>
+                </a:solidFill>
+                <a:miter lim="800000"/>
+                <a:headEnd/>
+                <a:tailEnd/>
+              </a14:hiddenLine>
+            </a:ext>
+          </a:extLst>
+        </p:spPr>
+      </p:pic>
+      <p:sp>
+        <p:nvSpPr>
+          <p:cNvPr id="43" name="TextBox 16">
+            <a:extLst>
+              <a:ext uri="{FF2B5EF4-FFF2-40B4-BE49-F238E27FC236}">
+                <a16:creationId xmlns:a16="http://schemas.microsoft.com/office/drawing/2014/main" id="{FCE97D6B-3440-4CA7-A35E-40948DEB8172}"/>
+              </a:ext>
+            </a:extLst>
+          </p:cNvPr>
+          <p:cNvSpPr txBox="1">
+            <a:spLocks noChangeArrowheads="1"/>
+          </p:cNvSpPr>
+          <p:nvPr/>
+        </p:nvSpPr>
+        <p:spPr bwMode="auto">
+          <a:xfrm>
+            <a:off x="5213684" y="3823458"/>
+            <a:ext cx="1261074" cy="261610"/>
+          </a:xfrm>
+          <a:prstGeom prst="rect">
+            <a:avLst/>
+          </a:prstGeom>
+          <a:noFill/>
+          <a:ln>
+            <a:noFill/>
+          </a:ln>
+          <a:extLst>
+            <a:ext uri="{909E8E84-426E-40DD-AFC4-6F175D3DCCD1}">
+              <a14:hiddenFill xmlns:a14="http://schemas.microsoft.com/office/drawing/2010/main">
+                <a:solidFill>
+                  <a:srgbClr val="FFFFFF"/>
+                </a:solidFill>
+              </a14:hiddenFill>
+            </a:ext>
+            <a:ext uri="{91240B29-F687-4F45-9708-019B960494DF}">
+              <a14:hiddenLine xmlns:a14="http://schemas.microsoft.com/office/drawing/2010/main" w="9525">
+                <a:solidFill>
+                  <a:srgbClr val="000000"/>
+                </a:solidFill>
+                <a:miter lim="800000"/>
+                <a:headEnd/>
+                <a:tailEnd/>
+              </a14:hiddenLine>
+            </a:ext>
+          </a:extLst>
+        </p:spPr>
+        <p:txBody>
+          <a:bodyPr wrap="square" lIns="0" rIns="0">
+            <a:spAutoFit/>
+          </a:bodyPr>
+          <a:lstStyle>
+            <a:lvl1pPr>
+              <a:defRPr>
+                <a:solidFill>
+                  <a:schemeClr val="tx1"/>
+                </a:solidFill>
+                <a:latin typeface="Calibri" panose="020F0502020204030204" pitchFamily="34" charset="0"/>
+              </a:defRPr>
+            </a:lvl1pPr>
+            <a:lvl2pPr marL="742950" indent="-285750">
+              <a:defRPr>
+                <a:solidFill>
+                  <a:schemeClr val="tx1"/>
+                </a:solidFill>
+                <a:latin typeface="Calibri" panose="020F0502020204030204" pitchFamily="34" charset="0"/>
+              </a:defRPr>
+            </a:lvl2pPr>
+            <a:lvl3pPr marL="1143000" indent="-228600">
+              <a:defRPr>
+                <a:solidFill>
+                  <a:schemeClr val="tx1"/>
+                </a:solidFill>
+                <a:latin typeface="Calibri" panose="020F0502020204030204" pitchFamily="34" charset="0"/>
+              </a:defRPr>
+            </a:lvl3pPr>
+            <a:lvl4pPr marL="1600200" indent="-228600">
+              <a:defRPr>
+                <a:solidFill>
+                  <a:schemeClr val="tx1"/>
+                </a:solidFill>
+                <a:latin typeface="Calibri" panose="020F0502020204030204" pitchFamily="34" charset="0"/>
+              </a:defRPr>
+            </a:lvl4pPr>
+            <a:lvl5pPr marL="2057400" indent="-228600">
+              <a:defRPr>
+                <a:solidFill>
+                  <a:schemeClr val="tx1"/>
+                </a:solidFill>
+                <a:latin typeface="Calibri" panose="020F0502020204030204" pitchFamily="34" charset="0"/>
+              </a:defRPr>
+            </a:lvl5pPr>
+            <a:lvl6pPr marL="2514600" indent="-228600" eaLnBrk="0" fontAlgn="base" hangingPunct="0">
+              <a:spcBef>
+                <a:spcPct val="0"/>
+              </a:spcBef>
+              <a:spcAft>
+                <a:spcPct val="0"/>
+              </a:spcAft>
+              <a:defRPr>
+                <a:solidFill>
+                  <a:schemeClr val="tx1"/>
+                </a:solidFill>
+                <a:latin typeface="Calibri" panose="020F0502020204030204" pitchFamily="34" charset="0"/>
+              </a:defRPr>
+            </a:lvl6pPr>
+            <a:lvl7pPr marL="2971800" indent="-228600" eaLnBrk="0" fontAlgn="base" hangingPunct="0">
+              <a:spcBef>
+                <a:spcPct val="0"/>
+              </a:spcBef>
+              <a:spcAft>
+                <a:spcPct val="0"/>
+              </a:spcAft>
+              <a:defRPr>
+                <a:solidFill>
+                  <a:schemeClr val="tx1"/>
+                </a:solidFill>
+                <a:latin typeface="Calibri" panose="020F0502020204030204" pitchFamily="34" charset="0"/>
+              </a:defRPr>
+            </a:lvl7pPr>
+            <a:lvl8pPr marL="3429000" indent="-228600" eaLnBrk="0" fontAlgn="base" hangingPunct="0">
+              <a:spcBef>
+                <a:spcPct val="0"/>
+              </a:spcBef>
+              <a:spcAft>
+                <a:spcPct val="0"/>
+              </a:spcAft>
+              <a:defRPr>
+                <a:solidFill>
+                  <a:schemeClr val="tx1"/>
+                </a:solidFill>
+                <a:latin typeface="Calibri" panose="020F0502020204030204" pitchFamily="34" charset="0"/>
+              </a:defRPr>
+            </a:lvl8pPr>
+            <a:lvl9pPr marL="3886200" indent="-228600" eaLnBrk="0" fontAlgn="base" hangingPunct="0">
+              <a:spcBef>
+                <a:spcPct val="0"/>
+              </a:spcBef>
+              <a:spcAft>
+                <a:spcPct val="0"/>
+              </a:spcAft>
+              <a:defRPr>
+                <a:solidFill>
+                  <a:schemeClr val="tx1"/>
+                </a:solidFill>
+                <a:latin typeface="Calibri" panose="020F0502020204030204" pitchFamily="34" charset="0"/>
+              </a:defRPr>
+            </a:lvl9pPr>
+          </a:lstStyle>
+          <a:p>
+            <a:pPr algn="ctr" eaLnBrk="1" hangingPunct="1"/>
+            <a:r>
+              <a:rPr lang="en-US" altLang="en-US" sz="1100" dirty="0">
+                <a:latin typeface="Arial" panose="020B0604020202020204" pitchFamily="34" charset="0"/>
+                <a:ea typeface="Amazon Ember" panose="020B0603020204020204" pitchFamily="34" charset="0"/>
+                <a:cs typeface="Arial" panose="020B0604020202020204" pitchFamily="34" charset="0"/>
+              </a:rPr>
+              <a:t>Linux bastion host</a:t>
+            </a:r>
+          </a:p>
+        </p:txBody>
+      </p:sp>
+      <p:sp>
+        <p:nvSpPr>
+          <p:cNvPr id="12" name="Rectangle 11">
+            <a:extLst>
+              <a:ext uri="{FF2B5EF4-FFF2-40B4-BE49-F238E27FC236}">
+                <a16:creationId xmlns:a16="http://schemas.microsoft.com/office/drawing/2014/main" id="{E36FA728-EBE3-495A-BC4A-D3B7E8B8447D}"/>
+              </a:ext>
+            </a:extLst>
+          </p:cNvPr>
+          <p:cNvSpPr/>
+          <p:nvPr/>
+        </p:nvSpPr>
+        <p:spPr>
+          <a:xfrm>
+            <a:off x="1587486" y="3211611"/>
+            <a:ext cx="5013840" cy="1023505"/>
+          </a:xfrm>
+          <a:prstGeom prst="rect">
+            <a:avLst/>
+          </a:prstGeom>
+          <a:noFill/>
+          <a:ln w="12700">
             <a:solidFill>
-              <a:srgbClr val="007CBC">
-                <a:alpha val="9804"/>
-              </a:srgbClr>
+              <a:srgbClr val="D86613"/>
             </a:solidFill>
-            <a:ln w="12700">
-              <a:noFill/>
-              <a:prstDash val="dash"/>
-            </a:ln>
-          </p:spPr>
-          <p:style>
-            <a:lnRef idx="2">
-              <a:schemeClr val="accent1">
-                <a:shade val="50000"/>
-              </a:schemeClr>
-            </a:lnRef>
-            <a:fillRef idx="1">
-              <a:schemeClr val="accent1"/>
-            </a:fillRef>
-            <a:effectRef idx="0">
-              <a:schemeClr val="accent1"/>
-            </a:effectRef>
-            <a:fontRef idx="minor">
-              <a:schemeClr val="lt1"/>
-            </a:fontRef>
-          </p:style>
-          <p:txBody>
-            <a:bodyPr lIns="502920"/>
-            <a:lstStyle/>
-            <a:p>
-              <a:pPr eaLnBrk="1" fontAlgn="auto" hangingPunct="1">
-                <a:spcBef>
-                  <a:spcPts val="0"/>
-                </a:spcBef>
-                <a:spcAft>
-                  <a:spcPts val="0"/>
-                </a:spcAft>
-                <a:defRPr/>
-              </a:pPr>
-              <a:r>
-                <a:rPr lang="en-US" sz="1200" dirty="0">
-                  <a:solidFill>
-                    <a:srgbClr val="5B9CD5"/>
-                  </a:solidFill>
-                  <a:latin typeface="Arial" panose="020B0604020202020204" pitchFamily="34" charset="0"/>
-                  <a:cs typeface="Arial" panose="020B0604020202020204" pitchFamily="34" charset="0"/>
-                </a:rPr>
-                <a:t>Private subnet</a:t>
-              </a:r>
-            </a:p>
-          </p:txBody>
-        </p:sp>
-        <p:pic>
-          <p:nvPicPr>
-            <p:cNvPr id="17" name="Graphic 16">
-              <a:extLst>
-                <a:ext uri="{FF2B5EF4-FFF2-40B4-BE49-F238E27FC236}">
-                  <a16:creationId xmlns:a16="http://schemas.microsoft.com/office/drawing/2014/main" id="{8DAADE7C-E81F-4841-B397-E41F1A29D58A}"/>
-                </a:ext>
-              </a:extLst>
-            </p:cNvPr>
-            <p:cNvPicPr>
-              <a:picLocks noChangeAspect="1"/>
-            </p:cNvPicPr>
-            <p:nvPr/>
-          </p:nvPicPr>
-          <p:blipFill>
-            <a:blip r:embed="rId9">
-              <a:extLst>
-                <a:ext uri="{96DAC541-7B7A-43D3-8B79-37D633B846F1}">
-                  <asvg:svgBlip xmlns:asvg="http://schemas.microsoft.com/office/drawing/2016/SVG/main" r:embed="rId10"/>
-                </a:ext>
-              </a:extLst>
-            </a:blip>
-            <a:stretch>
-              <a:fillRect/>
-            </a:stretch>
-          </p:blipFill>
-          <p:spPr>
-            <a:xfrm>
-              <a:off x="1444978" y="3769555"/>
-              <a:ext cx="381000" cy="381000"/>
-            </a:xfrm>
-            <a:prstGeom prst="rect">
-              <a:avLst/>
-            </a:prstGeom>
-          </p:spPr>
-        </p:pic>
-        <p:sp>
-          <p:nvSpPr>
-            <p:cNvPr id="18" name="Rectangle 17">
-              <a:extLst>
-                <a:ext uri="{FF2B5EF4-FFF2-40B4-BE49-F238E27FC236}">
-                  <a16:creationId xmlns:a16="http://schemas.microsoft.com/office/drawing/2014/main" id="{F8E817D2-448A-4EC9-BE1A-327DDA96B803}"/>
-                </a:ext>
-              </a:extLst>
-            </p:cNvPr>
-            <p:cNvSpPr/>
-            <p:nvPr/>
-          </p:nvSpPr>
-          <p:spPr>
-            <a:xfrm>
-              <a:off x="5895652" y="1850314"/>
-              <a:ext cx="2619626" cy="1782988"/>
-            </a:xfrm>
-            <a:prstGeom prst="rect">
-              <a:avLst/>
-            </a:prstGeom>
-            <a:solidFill>
-              <a:srgbClr val="1D8900">
-                <a:alpha val="9804"/>
-              </a:srgbClr>
-            </a:solidFill>
-            <a:ln w="12700">
-              <a:noFill/>
-              <a:prstDash val="dash"/>
-            </a:ln>
-          </p:spPr>
-          <p:style>
-            <a:lnRef idx="2">
-              <a:schemeClr val="accent1">
-                <a:shade val="50000"/>
-              </a:schemeClr>
-            </a:lnRef>
-            <a:fillRef idx="1">
-              <a:schemeClr val="accent1"/>
-            </a:fillRef>
-            <a:effectRef idx="0">
-              <a:schemeClr val="accent1"/>
-            </a:effectRef>
-            <a:fontRef idx="minor">
-              <a:schemeClr val="lt1"/>
-            </a:fontRef>
-          </p:style>
-          <p:txBody>
-            <a:bodyPr lIns="502920"/>
-            <a:lstStyle/>
-            <a:p>
-              <a:pPr eaLnBrk="1" fontAlgn="auto" hangingPunct="1">
-                <a:spcBef>
-                  <a:spcPts val="0"/>
-                </a:spcBef>
-                <a:spcAft>
-                  <a:spcPts val="0"/>
-                </a:spcAft>
-                <a:defRPr/>
-              </a:pPr>
-              <a:r>
-                <a:rPr lang="en-US" sz="1200" dirty="0">
-                  <a:solidFill>
-                    <a:srgbClr val="1E8900"/>
-                  </a:solidFill>
-                  <a:latin typeface="Arial" panose="020B0604020202020204" pitchFamily="34" charset="0"/>
-                  <a:cs typeface="Arial" panose="020B0604020202020204" pitchFamily="34" charset="0"/>
-                </a:rPr>
-                <a:t>Public subnet</a:t>
-              </a:r>
-            </a:p>
-          </p:txBody>
-        </p:sp>
-        <p:pic>
-          <p:nvPicPr>
-            <p:cNvPr id="19" name="Graphic 18">
-              <a:extLst>
-                <a:ext uri="{FF2B5EF4-FFF2-40B4-BE49-F238E27FC236}">
-                  <a16:creationId xmlns:a16="http://schemas.microsoft.com/office/drawing/2014/main" id="{AD7139BB-1851-466F-83B7-9D04DCF19010}"/>
-                </a:ext>
-              </a:extLst>
-            </p:cNvPr>
-            <p:cNvPicPr>
-              <a:picLocks noChangeAspect="1"/>
-            </p:cNvPicPr>
-            <p:nvPr/>
-          </p:nvPicPr>
-          <p:blipFill>
-            <a:blip r:embed="rId7">
-              <a:extLst>
-                <a:ext uri="{96DAC541-7B7A-43D3-8B79-37D633B846F1}">
-                  <asvg:svgBlip xmlns:asvg="http://schemas.microsoft.com/office/drawing/2016/SVG/main" r:embed="rId8"/>
-                </a:ext>
-              </a:extLst>
-            </a:blip>
-            <a:stretch>
-              <a:fillRect/>
-            </a:stretch>
-          </p:blipFill>
-          <p:spPr>
-            <a:xfrm>
-              <a:off x="5895652" y="1844132"/>
-              <a:ext cx="381000" cy="381000"/>
-            </a:xfrm>
-            <a:prstGeom prst="rect">
-              <a:avLst/>
-            </a:prstGeom>
-          </p:spPr>
-        </p:pic>
-        <p:sp>
-          <p:nvSpPr>
-            <p:cNvPr id="20" name="Rectangle 19">
-              <a:extLst>
-                <a:ext uri="{FF2B5EF4-FFF2-40B4-BE49-F238E27FC236}">
-                  <a16:creationId xmlns:a16="http://schemas.microsoft.com/office/drawing/2014/main" id="{C5472554-C32A-43AC-8C0D-3454E38C2801}"/>
-                </a:ext>
-              </a:extLst>
-            </p:cNvPr>
-            <p:cNvSpPr/>
-            <p:nvPr/>
-          </p:nvSpPr>
-          <p:spPr>
-            <a:xfrm>
-              <a:off x="5895652" y="3769555"/>
-              <a:ext cx="2619626" cy="935251"/>
-            </a:xfrm>
-            <a:prstGeom prst="rect">
-              <a:avLst/>
-            </a:prstGeom>
-            <a:solidFill>
-              <a:srgbClr val="007CBC">
-                <a:alpha val="9804"/>
-              </a:srgbClr>
-            </a:solidFill>
-            <a:ln w="12700">
-              <a:noFill/>
-              <a:prstDash val="dash"/>
-            </a:ln>
-          </p:spPr>
-          <p:style>
-            <a:lnRef idx="2">
-              <a:schemeClr val="accent1">
-                <a:shade val="50000"/>
-              </a:schemeClr>
-            </a:lnRef>
-            <a:fillRef idx="1">
-              <a:schemeClr val="accent1"/>
-            </a:fillRef>
-            <a:effectRef idx="0">
-              <a:schemeClr val="accent1"/>
-            </a:effectRef>
-            <a:fontRef idx="minor">
-              <a:schemeClr val="lt1"/>
-            </a:fontRef>
-          </p:style>
-          <p:txBody>
-            <a:bodyPr lIns="502920"/>
-            <a:lstStyle/>
-            <a:p>
-              <a:pPr eaLnBrk="1" fontAlgn="auto" hangingPunct="1">
-                <a:spcBef>
-                  <a:spcPts val="0"/>
-                </a:spcBef>
-                <a:spcAft>
-                  <a:spcPts val="0"/>
-                </a:spcAft>
-                <a:defRPr/>
-              </a:pPr>
-              <a:r>
-                <a:rPr lang="en-US" sz="1200" dirty="0">
-                  <a:solidFill>
-                    <a:srgbClr val="5B9CD5"/>
-                  </a:solidFill>
-                  <a:latin typeface="Arial" panose="020B0604020202020204" pitchFamily="34" charset="0"/>
-                  <a:cs typeface="Arial" panose="020B0604020202020204" pitchFamily="34" charset="0"/>
-                </a:rPr>
-                <a:t>Private subnet</a:t>
-              </a:r>
-            </a:p>
-          </p:txBody>
-        </p:sp>
-        <p:pic>
-          <p:nvPicPr>
-            <p:cNvPr id="21" name="Graphic 20">
-              <a:extLst>
-                <a:ext uri="{FF2B5EF4-FFF2-40B4-BE49-F238E27FC236}">
-                  <a16:creationId xmlns:a16="http://schemas.microsoft.com/office/drawing/2014/main" id="{12C207FB-6024-463C-A9DD-7450320BA0B9}"/>
-                </a:ext>
-              </a:extLst>
-            </p:cNvPr>
-            <p:cNvPicPr>
-              <a:picLocks noChangeAspect="1"/>
-            </p:cNvPicPr>
-            <p:nvPr/>
-          </p:nvPicPr>
-          <p:blipFill>
-            <a:blip r:embed="rId9">
-              <a:extLst>
-                <a:ext uri="{96DAC541-7B7A-43D3-8B79-37D633B846F1}">
-                  <asvg:svgBlip xmlns:asvg="http://schemas.microsoft.com/office/drawing/2016/SVG/main" r:embed="rId10"/>
-                </a:ext>
-              </a:extLst>
-            </a:blip>
-            <a:stretch>
-              <a:fillRect/>
-            </a:stretch>
-          </p:blipFill>
-          <p:spPr>
-            <a:xfrm>
-              <a:off x="5895652" y="3771420"/>
-              <a:ext cx="381000" cy="381000"/>
-            </a:xfrm>
-            <a:prstGeom prst="rect">
-              <a:avLst/>
-            </a:prstGeom>
-          </p:spPr>
-        </p:pic>
-        <p:sp>
-          <p:nvSpPr>
-            <p:cNvPr id="22" name="TextBox 17">
-              <a:extLst>
-                <a:ext uri="{FF2B5EF4-FFF2-40B4-BE49-F238E27FC236}">
-                  <a16:creationId xmlns:a16="http://schemas.microsoft.com/office/drawing/2014/main" id="{CEE25E96-A84C-434F-8C60-7C01FA69CAF4}"/>
-                </a:ext>
-              </a:extLst>
-            </p:cNvPr>
-            <p:cNvSpPr txBox="1">
-              <a:spLocks noChangeArrowheads="1"/>
-            </p:cNvSpPr>
-            <p:nvPr/>
-          </p:nvSpPr>
-          <p:spPr bwMode="auto">
-            <a:xfrm>
-              <a:off x="1459886" y="2987781"/>
-              <a:ext cx="1234766" cy="261610"/>
-            </a:xfrm>
-            <a:prstGeom prst="rect">
-              <a:avLst/>
-            </a:prstGeom>
-            <a:noFill/>
-            <a:ln>
-              <a:noFill/>
-            </a:ln>
-            <a:extLst>
-              <a:ext uri="{909E8E84-426E-40DD-AFC4-6F175D3DCCD1}">
-                <a14:hiddenFill xmlns:a14="http://schemas.microsoft.com/office/drawing/2010/main">
-                  <a:solidFill>
-                    <a:srgbClr val="FFFFFF"/>
-                  </a:solidFill>
-                </a14:hiddenFill>
-              </a:ext>
-              <a:ext uri="{91240B29-F687-4F45-9708-019B960494DF}">
-                <a14:hiddenLine xmlns:a14="http://schemas.microsoft.com/office/drawing/2010/main" w="9525">
-                  <a:solidFill>
-                    <a:srgbClr val="000000"/>
-                  </a:solidFill>
-                  <a:miter lim="800000"/>
-                  <a:headEnd/>
-                  <a:tailEnd/>
-                </a14:hiddenLine>
-              </a:ext>
-            </a:extLst>
-          </p:spPr>
-          <p:txBody>
-            <a:bodyPr wrap="square">
-              <a:spAutoFit/>
-            </a:bodyPr>
-            <a:lstStyle>
-              <a:lvl1pPr>
-                <a:defRPr>
-                  <a:solidFill>
-                    <a:schemeClr val="tx1"/>
-                  </a:solidFill>
-                  <a:latin typeface="Calibri" panose="020F0502020204030204" pitchFamily="34" charset="0"/>
-                </a:defRPr>
-              </a:lvl1pPr>
-              <a:lvl2pPr marL="742950" indent="-285750">
-                <a:defRPr>
-                  <a:solidFill>
-                    <a:schemeClr val="tx1"/>
-                  </a:solidFill>
-                  <a:latin typeface="Calibri" panose="020F0502020204030204" pitchFamily="34" charset="0"/>
-                </a:defRPr>
-              </a:lvl2pPr>
-              <a:lvl3pPr marL="1143000" indent="-228600">
-                <a:defRPr>
-                  <a:solidFill>
-                    <a:schemeClr val="tx1"/>
-                  </a:solidFill>
-                  <a:latin typeface="Calibri" panose="020F0502020204030204" pitchFamily="34" charset="0"/>
-                </a:defRPr>
-              </a:lvl3pPr>
-              <a:lvl4pPr marL="1600200" indent="-228600">
-                <a:defRPr>
-                  <a:solidFill>
-                    <a:schemeClr val="tx1"/>
-                  </a:solidFill>
-                  <a:latin typeface="Calibri" panose="020F0502020204030204" pitchFamily="34" charset="0"/>
-                </a:defRPr>
-              </a:lvl4pPr>
-              <a:lvl5pPr marL="2057400" indent="-228600">
-                <a:defRPr>
-                  <a:solidFill>
-                    <a:schemeClr val="tx1"/>
-                  </a:solidFill>
-                  <a:latin typeface="Calibri" panose="020F0502020204030204" pitchFamily="34" charset="0"/>
-                </a:defRPr>
-              </a:lvl5pPr>
-              <a:lvl6pPr marL="2514600" indent="-228600" eaLnBrk="0" fontAlgn="base" hangingPunct="0">
-                <a:spcBef>
-                  <a:spcPct val="0"/>
-                </a:spcBef>
-                <a:spcAft>
-                  <a:spcPct val="0"/>
-                </a:spcAft>
-                <a:defRPr>
-                  <a:solidFill>
-                    <a:schemeClr val="tx1"/>
-                  </a:solidFill>
-                  <a:latin typeface="Calibri" panose="020F0502020204030204" pitchFamily="34" charset="0"/>
-                </a:defRPr>
-              </a:lvl6pPr>
-              <a:lvl7pPr marL="2971800" indent="-228600" eaLnBrk="0" fontAlgn="base" hangingPunct="0">
-                <a:spcBef>
-                  <a:spcPct val="0"/>
-                </a:spcBef>
-                <a:spcAft>
-                  <a:spcPct val="0"/>
-                </a:spcAft>
-                <a:defRPr>
-                  <a:solidFill>
-                    <a:schemeClr val="tx1"/>
-                  </a:solidFill>
-                  <a:latin typeface="Calibri" panose="020F0502020204030204" pitchFamily="34" charset="0"/>
-                </a:defRPr>
-              </a:lvl7pPr>
-              <a:lvl8pPr marL="3429000" indent="-228600" eaLnBrk="0" fontAlgn="base" hangingPunct="0">
-                <a:spcBef>
-                  <a:spcPct val="0"/>
-                </a:spcBef>
-                <a:spcAft>
-                  <a:spcPct val="0"/>
-                </a:spcAft>
-                <a:defRPr>
-                  <a:solidFill>
-                    <a:schemeClr val="tx1"/>
-                  </a:solidFill>
-                  <a:latin typeface="Calibri" panose="020F0502020204030204" pitchFamily="34" charset="0"/>
-                </a:defRPr>
-              </a:lvl8pPr>
-              <a:lvl9pPr marL="3886200" indent="-228600" eaLnBrk="0" fontAlgn="base" hangingPunct="0">
-                <a:spcBef>
-                  <a:spcPct val="0"/>
-                </a:spcBef>
-                <a:spcAft>
-                  <a:spcPct val="0"/>
-                </a:spcAft>
-                <a:defRPr>
-                  <a:solidFill>
-                    <a:schemeClr val="tx1"/>
-                  </a:solidFill>
-                  <a:latin typeface="Calibri" panose="020F0502020204030204" pitchFamily="34" charset="0"/>
-                </a:defRPr>
-              </a:lvl9pPr>
-            </a:lstStyle>
-            <a:p>
-              <a:pPr algn="ctr" eaLnBrk="1" hangingPunct="1"/>
-              <a:r>
-                <a:rPr lang="en-US" altLang="en-US" sz="1100" dirty="0">
-                  <a:latin typeface="Arial" panose="020B0604020202020204" pitchFamily="34" charset="0"/>
-                  <a:ea typeface="Amazon Ember" panose="020B0603020204020204" pitchFamily="34" charset="0"/>
-                  <a:cs typeface="Arial" panose="020B0604020202020204" pitchFamily="34" charset="0"/>
-                </a:rPr>
-                <a:t>NAT gateway</a:t>
-              </a:r>
-            </a:p>
-          </p:txBody>
-        </p:sp>
-        <p:pic>
-          <p:nvPicPr>
-            <p:cNvPr id="23" name="Graphic 35">
-              <a:extLst>
-                <a:ext uri="{FF2B5EF4-FFF2-40B4-BE49-F238E27FC236}">
-                  <a16:creationId xmlns:a16="http://schemas.microsoft.com/office/drawing/2014/main" id="{33F1CD08-48FF-4EFD-81EE-58132E2E8C29}"/>
-                </a:ext>
-              </a:extLst>
-            </p:cNvPr>
-            <p:cNvPicPr>
-              <a:picLocks noChangeAspect="1" noChangeArrowheads="1"/>
-            </p:cNvPicPr>
-            <p:nvPr/>
-          </p:nvPicPr>
-          <p:blipFill>
-            <a:blip r:embed="rId11">
-              <a:extLst>
-                <a:ext uri="{28A0092B-C50C-407E-A947-70E740481C1C}">
-                  <a14:useLocalDpi xmlns:a14="http://schemas.microsoft.com/office/drawing/2010/main" val="0"/>
-                </a:ext>
-              </a:extLst>
-            </a:blip>
-            <a:srcRect/>
-            <a:stretch>
-              <a:fillRect/>
-            </a:stretch>
-          </p:blipFill>
-          <p:spPr bwMode="auto">
-            <a:xfrm>
-              <a:off x="1854945" y="2542930"/>
-              <a:ext cx="457200" cy="457200"/>
-            </a:xfrm>
-            <a:prstGeom prst="rect">
-              <a:avLst/>
-            </a:prstGeom>
-            <a:noFill/>
-            <a:ln>
-              <a:noFill/>
-            </a:ln>
-            <a:extLst>
-              <a:ext uri="{909E8E84-426E-40DD-AFC4-6F175D3DCCD1}">
-                <a14:hiddenFill xmlns:a14="http://schemas.microsoft.com/office/drawing/2010/main">
-                  <a:solidFill>
-                    <a:srgbClr val="FFFFFF"/>
-                  </a:solidFill>
-                </a14:hiddenFill>
-              </a:ext>
-              <a:ext uri="{91240B29-F687-4F45-9708-019B960494DF}">
-                <a14:hiddenLine xmlns:a14="http://schemas.microsoft.com/office/drawing/2010/main" w="9525">
-                  <a:solidFill>
-                    <a:srgbClr val="000000"/>
-                  </a:solidFill>
-                  <a:miter lim="800000"/>
-                  <a:headEnd/>
-                  <a:tailEnd/>
-                </a14:hiddenLine>
-              </a:ext>
-            </a:extLst>
-          </p:spPr>
-        </p:pic>
-        <p:sp>
-          <p:nvSpPr>
-            <p:cNvPr id="24" name="TextBox 17">
-              <a:extLst>
-                <a:ext uri="{FF2B5EF4-FFF2-40B4-BE49-F238E27FC236}">
-                  <a16:creationId xmlns:a16="http://schemas.microsoft.com/office/drawing/2014/main" id="{52567DE9-9A4F-47D6-94C8-1575EE042C07}"/>
-                </a:ext>
-              </a:extLst>
-            </p:cNvPr>
-            <p:cNvSpPr txBox="1">
-              <a:spLocks noChangeArrowheads="1"/>
-            </p:cNvSpPr>
-            <p:nvPr/>
-          </p:nvSpPr>
-          <p:spPr bwMode="auto">
-            <a:xfrm>
-              <a:off x="7242022" y="3005578"/>
-              <a:ext cx="1234766" cy="261610"/>
-            </a:xfrm>
-            <a:prstGeom prst="rect">
-              <a:avLst/>
-            </a:prstGeom>
-            <a:noFill/>
-            <a:ln>
-              <a:noFill/>
-            </a:ln>
-            <a:extLst>
-              <a:ext uri="{909E8E84-426E-40DD-AFC4-6F175D3DCCD1}">
-                <a14:hiddenFill xmlns:a14="http://schemas.microsoft.com/office/drawing/2010/main">
-                  <a:solidFill>
-                    <a:srgbClr val="FFFFFF"/>
-                  </a:solidFill>
-                </a14:hiddenFill>
-              </a:ext>
-              <a:ext uri="{91240B29-F687-4F45-9708-019B960494DF}">
-                <a14:hiddenLine xmlns:a14="http://schemas.microsoft.com/office/drawing/2010/main" w="9525">
-                  <a:solidFill>
-                    <a:srgbClr val="000000"/>
-                  </a:solidFill>
-                  <a:miter lim="800000"/>
-                  <a:headEnd/>
-                  <a:tailEnd/>
-                </a14:hiddenLine>
-              </a:ext>
-            </a:extLst>
-          </p:spPr>
-          <p:txBody>
-            <a:bodyPr wrap="square">
-              <a:spAutoFit/>
-            </a:bodyPr>
-            <a:lstStyle>
-              <a:lvl1pPr>
-                <a:defRPr>
-                  <a:solidFill>
-                    <a:schemeClr val="tx1"/>
-                  </a:solidFill>
-                  <a:latin typeface="Calibri" panose="020F0502020204030204" pitchFamily="34" charset="0"/>
-                </a:defRPr>
-              </a:lvl1pPr>
-              <a:lvl2pPr marL="742950" indent="-285750">
-                <a:defRPr>
-                  <a:solidFill>
-                    <a:schemeClr val="tx1"/>
-                  </a:solidFill>
-                  <a:latin typeface="Calibri" panose="020F0502020204030204" pitchFamily="34" charset="0"/>
-                </a:defRPr>
-              </a:lvl2pPr>
-              <a:lvl3pPr marL="1143000" indent="-228600">
-                <a:defRPr>
-                  <a:solidFill>
-                    <a:schemeClr val="tx1"/>
-                  </a:solidFill>
-                  <a:latin typeface="Calibri" panose="020F0502020204030204" pitchFamily="34" charset="0"/>
-                </a:defRPr>
-              </a:lvl3pPr>
-              <a:lvl4pPr marL="1600200" indent="-228600">
-                <a:defRPr>
-                  <a:solidFill>
-                    <a:schemeClr val="tx1"/>
-                  </a:solidFill>
-                  <a:latin typeface="Calibri" panose="020F0502020204030204" pitchFamily="34" charset="0"/>
-                </a:defRPr>
-              </a:lvl4pPr>
-              <a:lvl5pPr marL="2057400" indent="-228600">
-                <a:defRPr>
-                  <a:solidFill>
-                    <a:schemeClr val="tx1"/>
-                  </a:solidFill>
-                  <a:latin typeface="Calibri" panose="020F0502020204030204" pitchFamily="34" charset="0"/>
-                </a:defRPr>
-              </a:lvl5pPr>
-              <a:lvl6pPr marL="2514600" indent="-228600" eaLnBrk="0" fontAlgn="base" hangingPunct="0">
-                <a:spcBef>
-                  <a:spcPct val="0"/>
-                </a:spcBef>
-                <a:spcAft>
-                  <a:spcPct val="0"/>
-                </a:spcAft>
-                <a:defRPr>
-                  <a:solidFill>
-                    <a:schemeClr val="tx1"/>
-                  </a:solidFill>
-                  <a:latin typeface="Calibri" panose="020F0502020204030204" pitchFamily="34" charset="0"/>
-                </a:defRPr>
-              </a:lvl6pPr>
-              <a:lvl7pPr marL="2971800" indent="-228600" eaLnBrk="0" fontAlgn="base" hangingPunct="0">
-                <a:spcBef>
-                  <a:spcPct val="0"/>
-                </a:spcBef>
-                <a:spcAft>
-                  <a:spcPct val="0"/>
-                </a:spcAft>
-                <a:defRPr>
-                  <a:solidFill>
-                    <a:schemeClr val="tx1"/>
-                  </a:solidFill>
-                  <a:latin typeface="Calibri" panose="020F0502020204030204" pitchFamily="34" charset="0"/>
-                </a:defRPr>
-              </a:lvl7pPr>
-              <a:lvl8pPr marL="3429000" indent="-228600" eaLnBrk="0" fontAlgn="base" hangingPunct="0">
-                <a:spcBef>
-                  <a:spcPct val="0"/>
-                </a:spcBef>
-                <a:spcAft>
-                  <a:spcPct val="0"/>
-                </a:spcAft>
-                <a:defRPr>
-                  <a:solidFill>
-                    <a:schemeClr val="tx1"/>
-                  </a:solidFill>
-                  <a:latin typeface="Calibri" panose="020F0502020204030204" pitchFamily="34" charset="0"/>
-                </a:defRPr>
-              </a:lvl8pPr>
-              <a:lvl9pPr marL="3886200" indent="-228600" eaLnBrk="0" fontAlgn="base" hangingPunct="0">
-                <a:spcBef>
-                  <a:spcPct val="0"/>
-                </a:spcBef>
-                <a:spcAft>
-                  <a:spcPct val="0"/>
-                </a:spcAft>
-                <a:defRPr>
-                  <a:solidFill>
-                    <a:schemeClr val="tx1"/>
-                  </a:solidFill>
-                  <a:latin typeface="Calibri" panose="020F0502020204030204" pitchFamily="34" charset="0"/>
-                </a:defRPr>
-              </a:lvl9pPr>
-            </a:lstStyle>
-            <a:p>
-              <a:pPr algn="ctr" eaLnBrk="1" hangingPunct="1"/>
-              <a:r>
-                <a:rPr lang="en-US" altLang="en-US" sz="1100" dirty="0">
-                  <a:latin typeface="Arial" panose="020B0604020202020204" pitchFamily="34" charset="0"/>
-                  <a:ea typeface="Amazon Ember" panose="020B0603020204020204" pitchFamily="34" charset="0"/>
-                  <a:cs typeface="Arial" panose="020B0604020202020204" pitchFamily="34" charset="0"/>
-                </a:rPr>
-                <a:t>NAT gateway</a:t>
-              </a:r>
-            </a:p>
-          </p:txBody>
-        </p:sp>
-        <p:pic>
-          <p:nvPicPr>
-            <p:cNvPr id="25" name="Graphic 35">
-              <a:extLst>
-                <a:ext uri="{FF2B5EF4-FFF2-40B4-BE49-F238E27FC236}">
-                  <a16:creationId xmlns:a16="http://schemas.microsoft.com/office/drawing/2014/main" id="{B0356C1F-1161-458E-8145-3978EC59A3C4}"/>
-                </a:ext>
-              </a:extLst>
-            </p:cNvPr>
-            <p:cNvPicPr>
-              <a:picLocks noChangeAspect="1" noChangeArrowheads="1"/>
-            </p:cNvPicPr>
-            <p:nvPr/>
-          </p:nvPicPr>
-          <p:blipFill>
-            <a:blip r:embed="rId11">
-              <a:extLst>
-                <a:ext uri="{28A0092B-C50C-407E-A947-70E740481C1C}">
-                  <a14:useLocalDpi xmlns:a14="http://schemas.microsoft.com/office/drawing/2010/main" val="0"/>
-                </a:ext>
-              </a:extLst>
-            </a:blip>
-            <a:srcRect/>
-            <a:stretch>
-              <a:fillRect/>
-            </a:stretch>
-          </p:blipFill>
-          <p:spPr bwMode="auto">
-            <a:xfrm>
-              <a:off x="7631584" y="2542930"/>
-              <a:ext cx="457200" cy="457200"/>
-            </a:xfrm>
-            <a:prstGeom prst="rect">
-              <a:avLst/>
-            </a:prstGeom>
-            <a:noFill/>
-            <a:ln>
-              <a:noFill/>
-            </a:ln>
-            <a:extLst>
-              <a:ext uri="{909E8E84-426E-40DD-AFC4-6F175D3DCCD1}">
-                <a14:hiddenFill xmlns:a14="http://schemas.microsoft.com/office/drawing/2010/main">
-                  <a:solidFill>
-                    <a:srgbClr val="FFFFFF"/>
-                  </a:solidFill>
-                </a14:hiddenFill>
-              </a:ext>
-              <a:ext uri="{91240B29-F687-4F45-9708-019B960494DF}">
-                <a14:hiddenLine xmlns:a14="http://schemas.microsoft.com/office/drawing/2010/main" w="9525">
-                  <a:solidFill>
-                    <a:srgbClr val="000000"/>
-                  </a:solidFill>
-                  <a:miter lim="800000"/>
-                  <a:headEnd/>
-                  <a:tailEnd/>
-                </a14:hiddenLine>
-              </a:ext>
-            </a:extLst>
-          </p:spPr>
-        </p:pic>
-        <p:sp>
-          <p:nvSpPr>
-            <p:cNvPr id="27" name="TextBox 16">
-              <a:extLst>
-                <a:ext uri="{FF2B5EF4-FFF2-40B4-BE49-F238E27FC236}">
-                  <a16:creationId xmlns:a16="http://schemas.microsoft.com/office/drawing/2014/main" id="{6D31A402-2F3B-4CD6-9860-8AC77529E62B}"/>
-                </a:ext>
-              </a:extLst>
-            </p:cNvPr>
-            <p:cNvSpPr txBox="1">
-              <a:spLocks noChangeArrowheads="1"/>
-            </p:cNvSpPr>
-            <p:nvPr/>
-          </p:nvSpPr>
-          <p:spPr bwMode="auto">
-            <a:xfrm>
-              <a:off x="2822803" y="2973231"/>
-              <a:ext cx="1115568" cy="430887"/>
-            </a:xfrm>
-            <a:prstGeom prst="rect">
-              <a:avLst/>
-            </a:prstGeom>
-            <a:noFill/>
-            <a:ln>
-              <a:noFill/>
-            </a:ln>
-            <a:extLst>
-              <a:ext uri="{909E8E84-426E-40DD-AFC4-6F175D3DCCD1}">
-                <a14:hiddenFill xmlns:a14="http://schemas.microsoft.com/office/drawing/2010/main">
-                  <a:solidFill>
-                    <a:srgbClr val="FFFFFF"/>
-                  </a:solidFill>
-                </a14:hiddenFill>
-              </a:ext>
-              <a:ext uri="{91240B29-F687-4F45-9708-019B960494DF}">
-                <a14:hiddenLine xmlns:a14="http://schemas.microsoft.com/office/drawing/2010/main" w="9525">
-                  <a:solidFill>
-                    <a:srgbClr val="000000"/>
-                  </a:solidFill>
-                  <a:miter lim="800000"/>
-                  <a:headEnd/>
-                  <a:tailEnd/>
-                </a14:hiddenLine>
-              </a:ext>
-            </a:extLst>
-          </p:spPr>
-          <p:txBody>
-            <a:bodyPr wrap="square" lIns="0" rIns="0">
-              <a:spAutoFit/>
-            </a:bodyPr>
-            <a:lstStyle>
-              <a:lvl1pPr>
-                <a:defRPr>
-                  <a:solidFill>
-                    <a:schemeClr val="tx1"/>
-                  </a:solidFill>
-                  <a:latin typeface="Calibri" panose="020F0502020204030204" pitchFamily="34" charset="0"/>
-                </a:defRPr>
-              </a:lvl1pPr>
-              <a:lvl2pPr marL="742950" indent="-285750">
-                <a:defRPr>
-                  <a:solidFill>
-                    <a:schemeClr val="tx1"/>
-                  </a:solidFill>
-                  <a:latin typeface="Calibri" panose="020F0502020204030204" pitchFamily="34" charset="0"/>
-                </a:defRPr>
-              </a:lvl2pPr>
-              <a:lvl3pPr marL="1143000" indent="-228600">
-                <a:defRPr>
-                  <a:solidFill>
-                    <a:schemeClr val="tx1"/>
-                  </a:solidFill>
-                  <a:latin typeface="Calibri" panose="020F0502020204030204" pitchFamily="34" charset="0"/>
-                </a:defRPr>
-              </a:lvl3pPr>
-              <a:lvl4pPr marL="1600200" indent="-228600">
-                <a:defRPr>
-                  <a:solidFill>
-                    <a:schemeClr val="tx1"/>
-                  </a:solidFill>
-                  <a:latin typeface="Calibri" panose="020F0502020204030204" pitchFamily="34" charset="0"/>
-                </a:defRPr>
-              </a:lvl4pPr>
-              <a:lvl5pPr marL="2057400" indent="-228600">
-                <a:defRPr>
-                  <a:solidFill>
-                    <a:schemeClr val="tx1"/>
-                  </a:solidFill>
-                  <a:latin typeface="Calibri" panose="020F0502020204030204" pitchFamily="34" charset="0"/>
-                </a:defRPr>
-              </a:lvl5pPr>
-              <a:lvl6pPr marL="2514600" indent="-228600" eaLnBrk="0" fontAlgn="base" hangingPunct="0">
-                <a:spcBef>
-                  <a:spcPct val="0"/>
-                </a:spcBef>
-                <a:spcAft>
-                  <a:spcPct val="0"/>
-                </a:spcAft>
-                <a:defRPr>
-                  <a:solidFill>
-                    <a:schemeClr val="tx1"/>
-                  </a:solidFill>
-                  <a:latin typeface="Calibri" panose="020F0502020204030204" pitchFamily="34" charset="0"/>
-                </a:defRPr>
-              </a:lvl6pPr>
-              <a:lvl7pPr marL="2971800" indent="-228600" eaLnBrk="0" fontAlgn="base" hangingPunct="0">
-                <a:spcBef>
-                  <a:spcPct val="0"/>
-                </a:spcBef>
-                <a:spcAft>
-                  <a:spcPct val="0"/>
-                </a:spcAft>
-                <a:defRPr>
-                  <a:solidFill>
-                    <a:schemeClr val="tx1"/>
-                  </a:solidFill>
-                  <a:latin typeface="Calibri" panose="020F0502020204030204" pitchFamily="34" charset="0"/>
-                </a:defRPr>
-              </a:lvl7pPr>
-              <a:lvl8pPr marL="3429000" indent="-228600" eaLnBrk="0" fontAlgn="base" hangingPunct="0">
-                <a:spcBef>
-                  <a:spcPct val="0"/>
-                </a:spcBef>
-                <a:spcAft>
-                  <a:spcPct val="0"/>
-                </a:spcAft>
-                <a:defRPr>
-                  <a:solidFill>
-                    <a:schemeClr val="tx1"/>
-                  </a:solidFill>
-                  <a:latin typeface="Calibri" panose="020F0502020204030204" pitchFamily="34" charset="0"/>
-                </a:defRPr>
-              </a:lvl8pPr>
-              <a:lvl9pPr marL="3886200" indent="-228600" eaLnBrk="0" fontAlgn="base" hangingPunct="0">
-                <a:spcBef>
-                  <a:spcPct val="0"/>
-                </a:spcBef>
-                <a:spcAft>
-                  <a:spcPct val="0"/>
-                </a:spcAft>
-                <a:defRPr>
-                  <a:solidFill>
-                    <a:schemeClr val="tx1"/>
-                  </a:solidFill>
-                  <a:latin typeface="Calibri" panose="020F0502020204030204" pitchFamily="34" charset="0"/>
-                </a:defRPr>
-              </a:lvl9pPr>
-            </a:lstStyle>
-            <a:p>
-              <a:pPr algn="ctr" eaLnBrk="1" hangingPunct="1"/>
-              <a:r>
-                <a:rPr lang="en-US" altLang="en-US" sz="1100" dirty="0">
-                  <a:latin typeface="Arial" panose="020B0604020202020204" pitchFamily="34" charset="0"/>
-                  <a:ea typeface="Amazon Ember" panose="020B0603020204020204" pitchFamily="34" charset="0"/>
-                  <a:cs typeface="Arial" panose="020B0604020202020204" pitchFamily="34" charset="0"/>
-                </a:rPr>
-                <a:t>Linux bastion host</a:t>
-              </a:r>
-            </a:p>
-          </p:txBody>
-        </p:sp>
-        <p:sp>
-          <p:nvSpPr>
-            <p:cNvPr id="29" name="TextBox 16">
-              <a:extLst>
-                <a:ext uri="{FF2B5EF4-FFF2-40B4-BE49-F238E27FC236}">
-                  <a16:creationId xmlns:a16="http://schemas.microsoft.com/office/drawing/2014/main" id="{DB6A15CF-74A6-407F-85B3-089A116A7EA4}"/>
-                </a:ext>
-              </a:extLst>
-            </p:cNvPr>
-            <p:cNvSpPr txBox="1">
-              <a:spLocks noChangeArrowheads="1"/>
-            </p:cNvSpPr>
-            <p:nvPr/>
-          </p:nvSpPr>
-          <p:spPr bwMode="auto">
-            <a:xfrm>
-              <a:off x="6005833" y="2984752"/>
-              <a:ext cx="1115568" cy="430887"/>
-            </a:xfrm>
-            <a:prstGeom prst="rect">
-              <a:avLst/>
-            </a:prstGeom>
-            <a:noFill/>
-            <a:ln>
-              <a:noFill/>
-            </a:ln>
-            <a:extLst>
-              <a:ext uri="{909E8E84-426E-40DD-AFC4-6F175D3DCCD1}">
-                <a14:hiddenFill xmlns:a14="http://schemas.microsoft.com/office/drawing/2010/main">
-                  <a:solidFill>
-                    <a:srgbClr val="FFFFFF"/>
-                  </a:solidFill>
-                </a14:hiddenFill>
-              </a:ext>
-              <a:ext uri="{91240B29-F687-4F45-9708-019B960494DF}">
-                <a14:hiddenLine xmlns:a14="http://schemas.microsoft.com/office/drawing/2010/main" w="9525">
-                  <a:solidFill>
-                    <a:srgbClr val="000000"/>
-                  </a:solidFill>
-                  <a:miter lim="800000"/>
-                  <a:headEnd/>
-                  <a:tailEnd/>
-                </a14:hiddenLine>
-              </a:ext>
-            </a:extLst>
-          </p:spPr>
-          <p:txBody>
-            <a:bodyPr wrap="square" lIns="0" rIns="0">
-              <a:spAutoFit/>
-            </a:bodyPr>
-            <a:lstStyle>
-              <a:lvl1pPr>
-                <a:defRPr>
-                  <a:solidFill>
-                    <a:schemeClr val="tx1"/>
-                  </a:solidFill>
-                  <a:latin typeface="Calibri" panose="020F0502020204030204" pitchFamily="34" charset="0"/>
-                </a:defRPr>
-              </a:lvl1pPr>
-              <a:lvl2pPr marL="742950" indent="-285750">
-                <a:defRPr>
-                  <a:solidFill>
-                    <a:schemeClr val="tx1"/>
-                  </a:solidFill>
-                  <a:latin typeface="Calibri" panose="020F0502020204030204" pitchFamily="34" charset="0"/>
-                </a:defRPr>
-              </a:lvl2pPr>
-              <a:lvl3pPr marL="1143000" indent="-228600">
-                <a:defRPr>
-                  <a:solidFill>
-                    <a:schemeClr val="tx1"/>
-                  </a:solidFill>
-                  <a:latin typeface="Calibri" panose="020F0502020204030204" pitchFamily="34" charset="0"/>
-                </a:defRPr>
-              </a:lvl3pPr>
-              <a:lvl4pPr marL="1600200" indent="-228600">
-                <a:defRPr>
-                  <a:solidFill>
-                    <a:schemeClr val="tx1"/>
-                  </a:solidFill>
-                  <a:latin typeface="Calibri" panose="020F0502020204030204" pitchFamily="34" charset="0"/>
-                </a:defRPr>
-              </a:lvl4pPr>
-              <a:lvl5pPr marL="2057400" indent="-228600">
-                <a:defRPr>
-                  <a:solidFill>
-                    <a:schemeClr val="tx1"/>
-                  </a:solidFill>
-                  <a:latin typeface="Calibri" panose="020F0502020204030204" pitchFamily="34" charset="0"/>
-                </a:defRPr>
-              </a:lvl5pPr>
-              <a:lvl6pPr marL="2514600" indent="-228600" eaLnBrk="0" fontAlgn="base" hangingPunct="0">
-                <a:spcBef>
-                  <a:spcPct val="0"/>
-                </a:spcBef>
-                <a:spcAft>
-                  <a:spcPct val="0"/>
-                </a:spcAft>
-                <a:defRPr>
-                  <a:solidFill>
-                    <a:schemeClr val="tx1"/>
-                  </a:solidFill>
-                  <a:latin typeface="Calibri" panose="020F0502020204030204" pitchFamily="34" charset="0"/>
-                </a:defRPr>
-              </a:lvl6pPr>
-              <a:lvl7pPr marL="2971800" indent="-228600" eaLnBrk="0" fontAlgn="base" hangingPunct="0">
-                <a:spcBef>
-                  <a:spcPct val="0"/>
-                </a:spcBef>
-                <a:spcAft>
-                  <a:spcPct val="0"/>
-                </a:spcAft>
-                <a:defRPr>
-                  <a:solidFill>
-                    <a:schemeClr val="tx1"/>
-                  </a:solidFill>
-                  <a:latin typeface="Calibri" panose="020F0502020204030204" pitchFamily="34" charset="0"/>
-                </a:defRPr>
-              </a:lvl7pPr>
-              <a:lvl8pPr marL="3429000" indent="-228600" eaLnBrk="0" fontAlgn="base" hangingPunct="0">
-                <a:spcBef>
-                  <a:spcPct val="0"/>
-                </a:spcBef>
-                <a:spcAft>
-                  <a:spcPct val="0"/>
-                </a:spcAft>
-                <a:defRPr>
-                  <a:solidFill>
-                    <a:schemeClr val="tx1"/>
-                  </a:solidFill>
-                  <a:latin typeface="Calibri" panose="020F0502020204030204" pitchFamily="34" charset="0"/>
-                </a:defRPr>
-              </a:lvl8pPr>
-              <a:lvl9pPr marL="3886200" indent="-228600" eaLnBrk="0" fontAlgn="base" hangingPunct="0">
-                <a:spcBef>
-                  <a:spcPct val="0"/>
-                </a:spcBef>
-                <a:spcAft>
-                  <a:spcPct val="0"/>
-                </a:spcAft>
-                <a:defRPr>
-                  <a:solidFill>
-                    <a:schemeClr val="tx1"/>
-                  </a:solidFill>
-                  <a:latin typeface="Calibri" panose="020F0502020204030204" pitchFamily="34" charset="0"/>
-                </a:defRPr>
-              </a:lvl9pPr>
-            </a:lstStyle>
-            <a:p>
-              <a:pPr algn="ctr" eaLnBrk="1" hangingPunct="1"/>
-              <a:r>
-                <a:rPr lang="en-US" altLang="en-US" sz="1100" dirty="0">
-                  <a:latin typeface="Arial" panose="020B0604020202020204" pitchFamily="34" charset="0"/>
-                  <a:ea typeface="Amazon Ember" panose="020B0603020204020204" pitchFamily="34" charset="0"/>
-                  <a:cs typeface="Arial" panose="020B0604020202020204" pitchFamily="34" charset="0"/>
-                </a:rPr>
-                <a:t>Linux bastion host</a:t>
-              </a:r>
-            </a:p>
-          </p:txBody>
-        </p:sp>
-        <p:sp>
-          <p:nvSpPr>
-            <p:cNvPr id="12" name="Rectangle 11">
-              <a:extLst>
-                <a:ext uri="{FF2B5EF4-FFF2-40B4-BE49-F238E27FC236}">
-                  <a16:creationId xmlns:a16="http://schemas.microsoft.com/office/drawing/2014/main" id="{E36FA728-EBE3-495A-BC4A-D3B7E8B8447D}"/>
-                </a:ext>
-              </a:extLst>
-            </p:cNvPr>
-            <p:cNvSpPr/>
-            <p:nvPr/>
-          </p:nvSpPr>
-          <p:spPr>
-            <a:xfrm>
-              <a:off x="2758553" y="2361385"/>
-              <a:ext cx="4459647" cy="1067615"/>
-            </a:xfrm>
-            <a:prstGeom prst="rect">
-              <a:avLst/>
-            </a:prstGeom>
-            <a:noFill/>
-            <a:ln w="12700">
+            <a:prstDash val="dash"/>
+          </a:ln>
+        </p:spPr>
+        <p:style>
+          <a:lnRef idx="2">
+            <a:schemeClr val="accent1">
+              <a:shade val="50000"/>
+            </a:schemeClr>
+          </a:lnRef>
+          <a:fillRef idx="1">
+            <a:schemeClr val="accent1"/>
+          </a:fillRef>
+          <a:effectRef idx="0">
+            <a:schemeClr val="accent1"/>
+          </a:effectRef>
+          <a:fontRef idx="minor">
+            <a:schemeClr val="lt1"/>
+          </a:fontRef>
+        </p:style>
+        <p:txBody>
+          <a:bodyPr tIns="91440"/>
+          <a:lstStyle/>
+          <a:p>
+            <a:pPr algn="ctr" eaLnBrk="1" fontAlgn="auto" hangingPunct="1">
+              <a:spcBef>
+                <a:spcPts val="0"/>
+              </a:spcBef>
+              <a:spcAft>
+                <a:spcPts val="0"/>
+              </a:spcAft>
+              <a:defRPr/>
+            </a:pPr>
+            <a:endParaRPr lang="en-US" sz="1200" dirty="0">
               <a:solidFill>
                 <a:srgbClr val="D86613"/>
               </a:solidFill>
-              <a:prstDash val="dash"/>
-            </a:ln>
-          </p:spPr>
-          <p:style>
-            <a:lnRef idx="2">
-              <a:schemeClr val="accent1">
-                <a:shade val="50000"/>
-              </a:schemeClr>
-            </a:lnRef>
-            <a:fillRef idx="1">
-              <a:schemeClr val="accent1"/>
-            </a:fillRef>
-            <a:effectRef idx="0">
-              <a:schemeClr val="accent1"/>
-            </a:effectRef>
-            <a:fontRef idx="minor">
-              <a:schemeClr val="lt1"/>
-            </a:fontRef>
-          </p:style>
-          <p:txBody>
-            <a:bodyPr tIns="91440"/>
-            <a:lstStyle/>
-            <a:p>
-              <a:pPr algn="ctr" eaLnBrk="1" fontAlgn="auto" hangingPunct="1">
-                <a:spcBef>
-                  <a:spcPts val="0"/>
-                </a:spcBef>
-                <a:spcAft>
-                  <a:spcPts val="0"/>
-                </a:spcAft>
-                <a:defRPr/>
-              </a:pPr>
-              <a:endParaRPr lang="en-US" sz="1200" dirty="0">
+              <a:latin typeface="Arial" panose="020B0604020202020204" pitchFamily="34" charset="0"/>
+              <a:cs typeface="Arial" panose="020B0604020202020204" pitchFamily="34" charset="0"/>
+            </a:endParaRPr>
+          </a:p>
+          <a:p>
+            <a:pPr algn="ctr" eaLnBrk="1" fontAlgn="auto" hangingPunct="1">
+              <a:spcBef>
+                <a:spcPts val="0"/>
+              </a:spcBef>
+              <a:spcAft>
+                <a:spcPts val="0"/>
+              </a:spcAft>
+              <a:defRPr/>
+            </a:pPr>
+            <a:endParaRPr lang="en-US" sz="1200" dirty="0">
+              <a:solidFill>
+                <a:srgbClr val="D86613"/>
+              </a:solidFill>
+              <a:latin typeface="Arial" panose="020B0604020202020204" pitchFamily="34" charset="0"/>
+              <a:cs typeface="Arial" panose="020B0604020202020204" pitchFamily="34" charset="0"/>
+            </a:endParaRPr>
+          </a:p>
+          <a:p>
+            <a:pPr algn="ctr" eaLnBrk="1" fontAlgn="auto" hangingPunct="1">
+              <a:spcBef>
+                <a:spcPts val="0"/>
+              </a:spcBef>
+              <a:spcAft>
+                <a:spcPts val="0"/>
+              </a:spcAft>
+              <a:defRPr/>
+            </a:pPr>
+            <a:r>
+              <a:rPr lang="en-US" sz="1200" dirty="0">
                 <a:solidFill>
                   <a:srgbClr val="D86613"/>
                 </a:solidFill>
                 <a:latin typeface="Arial" panose="020B0604020202020204" pitchFamily="34" charset="0"/>
                 <a:cs typeface="Arial" panose="020B0604020202020204" pitchFamily="34" charset="0"/>
-              </a:endParaRPr>
-            </a:p>
-            <a:p>
-              <a:pPr algn="ctr" eaLnBrk="1" fontAlgn="auto" hangingPunct="1">
-                <a:spcBef>
-                  <a:spcPts val="0"/>
-                </a:spcBef>
-                <a:spcAft>
-                  <a:spcPts val="0"/>
-                </a:spcAft>
-                <a:defRPr/>
-              </a:pPr>
-              <a:endParaRPr lang="en-US" sz="1200" dirty="0">
-                <a:solidFill>
-                  <a:srgbClr val="D86613"/>
-                </a:solidFill>
-                <a:latin typeface="Arial" panose="020B0604020202020204" pitchFamily="34" charset="0"/>
-                <a:cs typeface="Arial" panose="020B0604020202020204" pitchFamily="34" charset="0"/>
-              </a:endParaRPr>
-            </a:p>
-            <a:p>
-              <a:pPr algn="ctr" eaLnBrk="1" fontAlgn="auto" hangingPunct="1">
-                <a:spcBef>
-                  <a:spcPts val="0"/>
-                </a:spcBef>
-                <a:spcAft>
-                  <a:spcPts val="0"/>
-                </a:spcAft>
-                <a:defRPr/>
-              </a:pPr>
-              <a:r>
-                <a:rPr lang="en-US" sz="1200" dirty="0">
-                  <a:solidFill>
-                    <a:srgbClr val="D86613"/>
-                  </a:solidFill>
-                  <a:latin typeface="Arial" panose="020B0604020202020204" pitchFamily="34" charset="0"/>
-                  <a:cs typeface="Arial" panose="020B0604020202020204" pitchFamily="34" charset="0"/>
-                </a:rPr>
-                <a:t>Auto Scaling group</a:t>
-              </a:r>
-            </a:p>
-          </p:txBody>
-        </p:sp>
-        <p:pic>
-          <p:nvPicPr>
-            <p:cNvPr id="13" name="Graphic 12">
-              <a:extLst>
-                <a:ext uri="{FF2B5EF4-FFF2-40B4-BE49-F238E27FC236}">
-                  <a16:creationId xmlns:a16="http://schemas.microsoft.com/office/drawing/2014/main" id="{794D467E-BDD5-4E69-B7D2-540C1E97B778}"/>
-                </a:ext>
-              </a:extLst>
-            </p:cNvPr>
-            <p:cNvPicPr>
-              <a:picLocks noChangeAspect="1"/>
-            </p:cNvPicPr>
-            <p:nvPr/>
-          </p:nvPicPr>
-          <p:blipFill>
-            <a:blip r:embed="rId12">
-              <a:extLst>
-                <a:ext uri="{96DAC541-7B7A-43D3-8B79-37D633B846F1}">
-                  <asvg:svgBlip xmlns:asvg="http://schemas.microsoft.com/office/drawing/2016/SVG/main" r:embed="rId13"/>
-                </a:ext>
-              </a:extLst>
-            </a:blip>
-            <a:stretch>
-              <a:fillRect/>
-            </a:stretch>
-          </p:blipFill>
-          <p:spPr>
-            <a:xfrm>
-              <a:off x="4806406" y="2361385"/>
-              <a:ext cx="381000" cy="381000"/>
-            </a:xfrm>
-            <a:prstGeom prst="rect">
-              <a:avLst/>
-            </a:prstGeom>
-          </p:spPr>
-        </p:pic>
-        <p:sp>
-          <p:nvSpPr>
-            <p:cNvPr id="33" name="TextBox 11">
-              <a:extLst>
-                <a:ext uri="{FF2B5EF4-FFF2-40B4-BE49-F238E27FC236}">
-                  <a16:creationId xmlns:a16="http://schemas.microsoft.com/office/drawing/2014/main" id="{01C154D9-74F7-4FB7-A62E-978150220BA7}"/>
-                </a:ext>
-              </a:extLst>
-            </p:cNvPr>
-            <p:cNvSpPr txBox="1">
-              <a:spLocks noChangeArrowheads="1"/>
-            </p:cNvSpPr>
-            <p:nvPr/>
-          </p:nvSpPr>
-          <p:spPr bwMode="auto">
-            <a:xfrm>
-              <a:off x="8914193" y="2727875"/>
-              <a:ext cx="1285574" cy="276999"/>
-            </a:xfrm>
-            <a:prstGeom prst="rect">
-              <a:avLst/>
-            </a:prstGeom>
-            <a:noFill/>
-            <a:ln>
-              <a:noFill/>
-            </a:ln>
-            <a:extLst>
-              <a:ext uri="{909E8E84-426E-40DD-AFC4-6F175D3DCCD1}">
-                <a14:hiddenFill xmlns:a14="http://schemas.microsoft.com/office/drawing/2010/main">
-                  <a:solidFill>
-                    <a:srgbClr val="FFFFFF"/>
-                  </a:solidFill>
-                </a14:hiddenFill>
-              </a:ext>
-              <a:ext uri="{91240B29-F687-4F45-9708-019B960494DF}">
-                <a14:hiddenLine xmlns:a14="http://schemas.microsoft.com/office/drawing/2010/main" w="9525">
-                  <a:solidFill>
-                    <a:srgbClr val="000000"/>
-                  </a:solidFill>
-                  <a:miter lim="800000"/>
-                  <a:headEnd/>
-                  <a:tailEnd/>
-                </a14:hiddenLine>
-              </a:ext>
-            </a:extLst>
-          </p:spPr>
-          <p:txBody>
-            <a:bodyPr wrap="square">
-              <a:spAutoFit/>
-            </a:bodyPr>
-            <a:lstStyle>
-              <a:lvl1pPr>
-                <a:defRPr>
-                  <a:solidFill>
-                    <a:schemeClr val="tx1"/>
-                  </a:solidFill>
-                  <a:latin typeface="Calibri" panose="020F0502020204030204" pitchFamily="34" charset="0"/>
-                </a:defRPr>
-              </a:lvl1pPr>
-              <a:lvl2pPr marL="742950" indent="-285750">
-                <a:defRPr>
-                  <a:solidFill>
-                    <a:schemeClr val="tx1"/>
-                  </a:solidFill>
-                  <a:latin typeface="Calibri" panose="020F0502020204030204" pitchFamily="34" charset="0"/>
-                </a:defRPr>
-              </a:lvl2pPr>
-              <a:lvl3pPr marL="1143000" indent="-228600">
-                <a:defRPr>
-                  <a:solidFill>
-                    <a:schemeClr val="tx1"/>
-                  </a:solidFill>
-                  <a:latin typeface="Calibri" panose="020F0502020204030204" pitchFamily="34" charset="0"/>
-                </a:defRPr>
-              </a:lvl3pPr>
-              <a:lvl4pPr marL="1600200" indent="-228600">
-                <a:defRPr>
-                  <a:solidFill>
-                    <a:schemeClr val="tx1"/>
-                  </a:solidFill>
-                  <a:latin typeface="Calibri" panose="020F0502020204030204" pitchFamily="34" charset="0"/>
-                </a:defRPr>
-              </a:lvl4pPr>
-              <a:lvl5pPr marL="2057400" indent="-228600">
-                <a:defRPr>
-                  <a:solidFill>
-                    <a:schemeClr val="tx1"/>
-                  </a:solidFill>
-                  <a:latin typeface="Calibri" panose="020F0502020204030204" pitchFamily="34" charset="0"/>
-                </a:defRPr>
-              </a:lvl5pPr>
-              <a:lvl6pPr marL="2514600" indent="-228600" eaLnBrk="0" fontAlgn="base" hangingPunct="0">
-                <a:spcBef>
-                  <a:spcPct val="0"/>
-                </a:spcBef>
-                <a:spcAft>
-                  <a:spcPct val="0"/>
-                </a:spcAft>
-                <a:defRPr>
-                  <a:solidFill>
-                    <a:schemeClr val="tx1"/>
-                  </a:solidFill>
-                  <a:latin typeface="Calibri" panose="020F0502020204030204" pitchFamily="34" charset="0"/>
-                </a:defRPr>
-              </a:lvl6pPr>
-              <a:lvl7pPr marL="2971800" indent="-228600" eaLnBrk="0" fontAlgn="base" hangingPunct="0">
-                <a:spcBef>
-                  <a:spcPct val="0"/>
-                </a:spcBef>
-                <a:spcAft>
-                  <a:spcPct val="0"/>
-                </a:spcAft>
-                <a:defRPr>
-                  <a:solidFill>
-                    <a:schemeClr val="tx1"/>
-                  </a:solidFill>
-                  <a:latin typeface="Calibri" panose="020F0502020204030204" pitchFamily="34" charset="0"/>
-                </a:defRPr>
-              </a:lvl7pPr>
-              <a:lvl8pPr marL="3429000" indent="-228600" eaLnBrk="0" fontAlgn="base" hangingPunct="0">
-                <a:spcBef>
-                  <a:spcPct val="0"/>
-                </a:spcBef>
-                <a:spcAft>
-                  <a:spcPct val="0"/>
-                </a:spcAft>
-                <a:defRPr>
-                  <a:solidFill>
-                    <a:schemeClr val="tx1"/>
-                  </a:solidFill>
-                  <a:latin typeface="Calibri" panose="020F0502020204030204" pitchFamily="34" charset="0"/>
-                </a:defRPr>
-              </a:lvl8pPr>
-              <a:lvl9pPr marL="3886200" indent="-228600" eaLnBrk="0" fontAlgn="base" hangingPunct="0">
-                <a:spcBef>
-                  <a:spcPct val="0"/>
-                </a:spcBef>
-                <a:spcAft>
-                  <a:spcPct val="0"/>
-                </a:spcAft>
-                <a:defRPr>
-                  <a:solidFill>
-                    <a:schemeClr val="tx1"/>
-                  </a:solidFill>
-                  <a:latin typeface="Calibri" panose="020F0502020204030204" pitchFamily="34" charset="0"/>
-                </a:defRPr>
-              </a:lvl9pPr>
-            </a:lstStyle>
-            <a:p>
-              <a:pPr algn="ctr"/>
-              <a:r>
-                <a:rPr lang="en-US" altLang="en-US" sz="1200" dirty="0">
-                  <a:latin typeface="Arial" panose="020B0604020202020204" pitchFamily="34" charset="0"/>
-                  <a:ea typeface="Amazon Ember" panose="020B0603020204020204" pitchFamily="34" charset="0"/>
-                  <a:cs typeface="Arial" panose="020B0604020202020204" pitchFamily="34" charset="0"/>
-                </a:rPr>
-                <a:t>CloudWatch</a:t>
-              </a:r>
-            </a:p>
-          </p:txBody>
-        </p:sp>
-        <p:pic>
-          <p:nvPicPr>
-            <p:cNvPr id="32" name="Graphic 60">
-              <a:extLst>
-                <a:ext uri="{FF2B5EF4-FFF2-40B4-BE49-F238E27FC236}">
-                  <a16:creationId xmlns:a16="http://schemas.microsoft.com/office/drawing/2014/main" id="{DF86A74A-71C9-4EA9-896A-7C288CAA71EF}"/>
-                </a:ext>
-              </a:extLst>
-            </p:cNvPr>
-            <p:cNvPicPr>
-              <a:picLocks noChangeAspect="1" noChangeArrowheads="1"/>
-            </p:cNvPicPr>
-            <p:nvPr/>
-          </p:nvPicPr>
-          <p:blipFill>
-            <a:blip r:embed="rId14">
-              <a:extLst>
-                <a:ext uri="{28A0092B-C50C-407E-A947-70E740481C1C}">
-                  <a14:useLocalDpi xmlns:a14="http://schemas.microsoft.com/office/drawing/2010/main" val="0"/>
-                </a:ext>
-              </a:extLst>
-            </a:blip>
-            <a:srcRect/>
-            <a:stretch>
-              <a:fillRect/>
-            </a:stretch>
-          </p:blipFill>
-          <p:spPr bwMode="auto">
-            <a:xfrm>
-              <a:off x="3151987" y="2537838"/>
-              <a:ext cx="457200" cy="457200"/>
-            </a:xfrm>
-            <a:prstGeom prst="rect">
-              <a:avLst/>
-            </a:prstGeom>
-            <a:noFill/>
-            <a:ln>
-              <a:noFill/>
-            </a:ln>
-            <a:extLst>
-              <a:ext uri="{909E8E84-426E-40DD-AFC4-6F175D3DCCD1}">
-                <a14:hiddenFill xmlns:a14="http://schemas.microsoft.com/office/drawing/2010/main">
-                  <a:solidFill>
-                    <a:srgbClr val="FFFFFF"/>
-                  </a:solidFill>
-                </a14:hiddenFill>
-              </a:ext>
-              <a:ext uri="{91240B29-F687-4F45-9708-019B960494DF}">
-                <a14:hiddenLine xmlns:a14="http://schemas.microsoft.com/office/drawing/2010/main" w="9525">
-                  <a:solidFill>
-                    <a:srgbClr val="000000"/>
-                  </a:solidFill>
-                  <a:miter lim="800000"/>
-                  <a:headEnd/>
-                  <a:tailEnd/>
-                </a14:hiddenLine>
-              </a:ext>
-            </a:extLst>
-          </p:spPr>
-        </p:pic>
-        <p:pic>
-          <p:nvPicPr>
-            <p:cNvPr id="35" name="Graphic 60">
-              <a:extLst>
-                <a:ext uri="{FF2B5EF4-FFF2-40B4-BE49-F238E27FC236}">
-                  <a16:creationId xmlns:a16="http://schemas.microsoft.com/office/drawing/2014/main" id="{B2D044DF-F87B-49A2-B710-9E8ECA5B1A98}"/>
-                </a:ext>
-              </a:extLst>
-            </p:cNvPr>
-            <p:cNvPicPr>
-              <a:picLocks noChangeAspect="1" noChangeArrowheads="1"/>
-            </p:cNvPicPr>
-            <p:nvPr/>
-          </p:nvPicPr>
-          <p:blipFill>
-            <a:blip r:embed="rId15">
-              <a:alphaModFix amt="50000"/>
-              <a:extLst>
-                <a:ext uri="{BEBA8EAE-BF5A-486C-A8C5-ECC9F3942E4B}">
-                  <a14:imgProps xmlns:a14="http://schemas.microsoft.com/office/drawing/2010/main">
-                    <a14:imgLayer r:embed="rId16">
-                      <a14:imgEffect>
-                        <a14:artisticBlur/>
-                      </a14:imgEffect>
-                    </a14:imgLayer>
-                  </a14:imgProps>
-                </a:ext>
-                <a:ext uri="{28A0092B-C50C-407E-A947-70E740481C1C}">
-                  <a14:useLocalDpi xmlns:a14="http://schemas.microsoft.com/office/drawing/2010/main" val="0"/>
-                </a:ext>
-              </a:extLst>
-            </a:blip>
-            <a:srcRect/>
-            <a:stretch>
-              <a:fillRect/>
-            </a:stretch>
-          </p:blipFill>
-          <p:spPr bwMode="auto">
-            <a:xfrm>
-              <a:off x="6335017" y="2545603"/>
-              <a:ext cx="457200" cy="457200"/>
-            </a:xfrm>
-            <a:prstGeom prst="rect">
-              <a:avLst/>
-            </a:prstGeom>
-            <a:noFill/>
-            <a:ln>
-              <a:noFill/>
-            </a:ln>
-            <a:extLst>
-              <a:ext uri="{909E8E84-426E-40DD-AFC4-6F175D3DCCD1}">
-                <a14:hiddenFill xmlns:a14="http://schemas.microsoft.com/office/drawing/2010/main">
-                  <a:solidFill>
-                    <a:srgbClr val="FFFFFF"/>
-                  </a:solidFill>
-                </a14:hiddenFill>
-              </a:ext>
-              <a:ext uri="{91240B29-F687-4F45-9708-019B960494DF}">
-                <a14:hiddenLine xmlns:a14="http://schemas.microsoft.com/office/drawing/2010/main" w="9525">
-                  <a:solidFill>
-                    <a:srgbClr val="000000"/>
-                  </a:solidFill>
-                  <a:miter lim="800000"/>
-                  <a:headEnd/>
-                  <a:tailEnd/>
-                </a14:hiddenLine>
-              </a:ext>
-            </a:extLst>
-          </p:spPr>
-        </p:pic>
-        <p:sp>
-          <p:nvSpPr>
-            <p:cNvPr id="36" name="TextBox 9">
-              <a:extLst>
-                <a:ext uri="{FF2B5EF4-FFF2-40B4-BE49-F238E27FC236}">
-                  <a16:creationId xmlns:a16="http://schemas.microsoft.com/office/drawing/2014/main" id="{F603C76B-0C0A-470C-917A-2B291C84B38E}"/>
-                </a:ext>
-              </a:extLst>
-            </p:cNvPr>
-            <p:cNvSpPr txBox="1">
-              <a:spLocks noChangeArrowheads="1"/>
-            </p:cNvSpPr>
-            <p:nvPr/>
-          </p:nvSpPr>
-          <p:spPr bwMode="auto">
-            <a:xfrm>
-              <a:off x="8914193" y="4009192"/>
-              <a:ext cx="1285574" cy="276999"/>
-            </a:xfrm>
-            <a:prstGeom prst="rect">
-              <a:avLst/>
-            </a:prstGeom>
-            <a:noFill/>
-            <a:ln>
-              <a:noFill/>
-            </a:ln>
-            <a:extLst>
-              <a:ext uri="{909E8E84-426E-40DD-AFC4-6F175D3DCCD1}">
-                <a14:hiddenFill xmlns:a14="http://schemas.microsoft.com/office/drawing/2010/main">
-                  <a:solidFill>
-                    <a:srgbClr val="FFFFFF"/>
-                  </a:solidFill>
-                </a14:hiddenFill>
-              </a:ext>
-              <a:ext uri="{91240B29-F687-4F45-9708-019B960494DF}">
-                <a14:hiddenLine xmlns:a14="http://schemas.microsoft.com/office/drawing/2010/main" w="9525">
-                  <a:solidFill>
-                    <a:srgbClr val="000000"/>
-                  </a:solidFill>
-                  <a:miter lim="800000"/>
-                  <a:headEnd/>
-                  <a:tailEnd/>
-                </a14:hiddenLine>
-              </a:ext>
-            </a:extLst>
-          </p:spPr>
-          <p:txBody>
-            <a:bodyPr wrap="square" lIns="0" rIns="0">
-              <a:spAutoFit/>
-            </a:bodyPr>
-            <a:lstStyle>
-              <a:lvl1pPr>
-                <a:defRPr>
-                  <a:solidFill>
-                    <a:schemeClr val="tx1"/>
-                  </a:solidFill>
-                  <a:latin typeface="Calibri" panose="020F0502020204030204" pitchFamily="34" charset="0"/>
-                </a:defRPr>
-              </a:lvl1pPr>
-              <a:lvl2pPr marL="742950" indent="-285750">
-                <a:defRPr>
-                  <a:solidFill>
-                    <a:schemeClr val="tx1"/>
-                  </a:solidFill>
-                  <a:latin typeface="Calibri" panose="020F0502020204030204" pitchFamily="34" charset="0"/>
-                </a:defRPr>
-              </a:lvl2pPr>
-              <a:lvl3pPr marL="1143000" indent="-228600">
-                <a:defRPr>
-                  <a:solidFill>
-                    <a:schemeClr val="tx1"/>
-                  </a:solidFill>
-                  <a:latin typeface="Calibri" panose="020F0502020204030204" pitchFamily="34" charset="0"/>
-                </a:defRPr>
-              </a:lvl3pPr>
-              <a:lvl4pPr marL="1600200" indent="-228600">
-                <a:defRPr>
-                  <a:solidFill>
-                    <a:schemeClr val="tx1"/>
-                  </a:solidFill>
-                  <a:latin typeface="Calibri" panose="020F0502020204030204" pitchFamily="34" charset="0"/>
-                </a:defRPr>
-              </a:lvl4pPr>
-              <a:lvl5pPr marL="2057400" indent="-228600">
-                <a:defRPr>
-                  <a:solidFill>
-                    <a:schemeClr val="tx1"/>
-                  </a:solidFill>
-                  <a:latin typeface="Calibri" panose="020F0502020204030204" pitchFamily="34" charset="0"/>
-                </a:defRPr>
-              </a:lvl5pPr>
-              <a:lvl6pPr marL="2514600" indent="-228600" eaLnBrk="0" fontAlgn="base" hangingPunct="0">
-                <a:spcBef>
-                  <a:spcPct val="0"/>
-                </a:spcBef>
-                <a:spcAft>
-                  <a:spcPct val="0"/>
-                </a:spcAft>
-                <a:defRPr>
-                  <a:solidFill>
-                    <a:schemeClr val="tx1"/>
-                  </a:solidFill>
-                  <a:latin typeface="Calibri" panose="020F0502020204030204" pitchFamily="34" charset="0"/>
-                </a:defRPr>
-              </a:lvl6pPr>
-              <a:lvl7pPr marL="2971800" indent="-228600" eaLnBrk="0" fontAlgn="base" hangingPunct="0">
-                <a:spcBef>
-                  <a:spcPct val="0"/>
-                </a:spcBef>
-                <a:spcAft>
-                  <a:spcPct val="0"/>
-                </a:spcAft>
-                <a:defRPr>
-                  <a:solidFill>
-                    <a:schemeClr val="tx1"/>
-                  </a:solidFill>
-                  <a:latin typeface="Calibri" panose="020F0502020204030204" pitchFamily="34" charset="0"/>
-                </a:defRPr>
-              </a:lvl7pPr>
-              <a:lvl8pPr marL="3429000" indent="-228600" eaLnBrk="0" fontAlgn="base" hangingPunct="0">
-                <a:spcBef>
-                  <a:spcPct val="0"/>
-                </a:spcBef>
-                <a:spcAft>
-                  <a:spcPct val="0"/>
-                </a:spcAft>
-                <a:defRPr>
-                  <a:solidFill>
-                    <a:schemeClr val="tx1"/>
-                  </a:solidFill>
-                  <a:latin typeface="Calibri" panose="020F0502020204030204" pitchFamily="34" charset="0"/>
-                </a:defRPr>
-              </a:lvl8pPr>
-              <a:lvl9pPr marL="3886200" indent="-228600" eaLnBrk="0" fontAlgn="base" hangingPunct="0">
-                <a:spcBef>
-                  <a:spcPct val="0"/>
-                </a:spcBef>
-                <a:spcAft>
-                  <a:spcPct val="0"/>
-                </a:spcAft>
-                <a:defRPr>
-                  <a:solidFill>
-                    <a:schemeClr val="tx1"/>
-                  </a:solidFill>
-                  <a:latin typeface="Calibri" panose="020F0502020204030204" pitchFamily="34" charset="0"/>
-                </a:defRPr>
-              </a:lvl9pPr>
-            </a:lstStyle>
-            <a:p>
-              <a:pPr algn="ctr" eaLnBrk="1" hangingPunct="1"/>
-              <a:r>
-                <a:rPr lang="en-US" altLang="en-US" sz="1200" dirty="0">
-                  <a:latin typeface="Arial" panose="020B0604020202020204" pitchFamily="34" charset="0"/>
-                  <a:ea typeface="Amazon Ember" panose="020B0603020204020204" pitchFamily="34" charset="0"/>
-                  <a:cs typeface="Arial" panose="020B0604020202020204" pitchFamily="34" charset="0"/>
-                </a:rPr>
-                <a:t>Systems Manager</a:t>
-              </a:r>
-            </a:p>
-          </p:txBody>
-        </p:sp>
-        <p:pic>
-          <p:nvPicPr>
-            <p:cNvPr id="37" name="Graphic 15">
-              <a:extLst>
-                <a:ext uri="{FF2B5EF4-FFF2-40B4-BE49-F238E27FC236}">
-                  <a16:creationId xmlns:a16="http://schemas.microsoft.com/office/drawing/2014/main" id="{EC9C6A2F-D7C6-4685-9600-E83BABD1E579}"/>
-                </a:ext>
-              </a:extLst>
-            </p:cNvPr>
-            <p:cNvPicPr>
-              <a:picLocks noChangeAspect="1" noChangeArrowheads="1"/>
-            </p:cNvPicPr>
-            <p:nvPr/>
-          </p:nvPicPr>
-          <p:blipFill>
-            <a:blip r:embed="rId17">
-              <a:extLst>
-                <a:ext uri="{28A0092B-C50C-407E-A947-70E740481C1C}">
-                  <a14:useLocalDpi xmlns:a14="http://schemas.microsoft.com/office/drawing/2010/main" val="0"/>
-                </a:ext>
-              </a:extLst>
-            </a:blip>
-            <a:srcRect/>
-            <a:stretch>
-              <a:fillRect/>
-            </a:stretch>
-          </p:blipFill>
-          <p:spPr bwMode="auto">
-            <a:xfrm>
-              <a:off x="9175980" y="3247192"/>
-              <a:ext cx="762000" cy="762000"/>
-            </a:xfrm>
-            <a:prstGeom prst="rect">
-              <a:avLst/>
-            </a:prstGeom>
-            <a:noFill/>
-            <a:ln>
-              <a:noFill/>
-            </a:ln>
-            <a:extLst>
-              <a:ext uri="{909E8E84-426E-40DD-AFC4-6F175D3DCCD1}">
-                <a14:hiddenFill xmlns:a14="http://schemas.microsoft.com/office/drawing/2010/main">
-                  <a:solidFill>
-                    <a:srgbClr val="FFFFFF"/>
-                  </a:solidFill>
-                </a14:hiddenFill>
-              </a:ext>
-              <a:ext uri="{91240B29-F687-4F45-9708-019B960494DF}">
-                <a14:hiddenLine xmlns:a14="http://schemas.microsoft.com/office/drawing/2010/main" w="9525">
-                  <a:solidFill>
-                    <a:srgbClr val="000000"/>
-                  </a:solidFill>
-                  <a:miter lim="800000"/>
-                  <a:headEnd/>
-                  <a:tailEnd/>
-                </a14:hiddenLine>
-              </a:ext>
-            </a:extLst>
-          </p:spPr>
-        </p:pic>
-      </p:grpSp>
+              </a:rPr>
+              <a:t>Auto Scaling group</a:t>
+            </a:r>
+          </a:p>
+        </p:txBody>
+      </p:sp>
     </p:spTree>
     <p:extLst>
       <p:ext uri="{BB962C8B-B14F-4D97-AF65-F5344CB8AC3E}">

</xml_diff>